<commit_message>
Migrated To-Do to Trello
Began working more on the CYOA maps, but nothing significant.
</commit_message>
<xml_diff>
--- a/CYOA Maps.pptx
+++ b/CYOA Maps.pptx
@@ -107,6 +107,11 @@
       </a:defRPr>
     </a:lvl9pPr>
   </p:defaultTextStyle>
+  <p:extLst>
+    <p:ext uri="{EFAFB233-063F-42B5-8137-9DF3F51BA10A}">
+      <p15:sldGuideLst xmlns:p15="http://schemas.microsoft.com/office/powerpoint/2012/main"/>
+    </p:ext>
+  </p:extLst>
 </p:presentation>
 </file>
 
@@ -241,7 +246,7 @@
           <a:p>
             <a:fld id="{13F2DEAA-2609-498B-866E-7E372419543E}" type="datetimeFigureOut">
               <a:rPr lang="en-US" smtClean="0"/>
-              <a:t>7/15/2016</a:t>
+              <a:t>7/18/2016</a:t>
             </a:fld>
             <a:endParaRPr lang="en-US"/>
           </a:p>
@@ -411,7 +416,7 @@
           <a:p>
             <a:fld id="{13F2DEAA-2609-498B-866E-7E372419543E}" type="datetimeFigureOut">
               <a:rPr lang="en-US" smtClean="0"/>
-              <a:t>7/15/2016</a:t>
+              <a:t>7/18/2016</a:t>
             </a:fld>
             <a:endParaRPr lang="en-US"/>
           </a:p>
@@ -591,7 +596,7 @@
           <a:p>
             <a:fld id="{13F2DEAA-2609-498B-866E-7E372419543E}" type="datetimeFigureOut">
               <a:rPr lang="en-US" smtClean="0"/>
-              <a:t>7/15/2016</a:t>
+              <a:t>7/18/2016</a:t>
             </a:fld>
             <a:endParaRPr lang="en-US"/>
           </a:p>
@@ -761,7 +766,7 @@
           <a:p>
             <a:fld id="{13F2DEAA-2609-498B-866E-7E372419543E}" type="datetimeFigureOut">
               <a:rPr lang="en-US" smtClean="0"/>
-              <a:t>7/15/2016</a:t>
+              <a:t>7/18/2016</a:t>
             </a:fld>
             <a:endParaRPr lang="en-US"/>
           </a:p>
@@ -1005,7 +1010,7 @@
           <a:p>
             <a:fld id="{13F2DEAA-2609-498B-866E-7E372419543E}" type="datetimeFigureOut">
               <a:rPr lang="en-US" smtClean="0"/>
-              <a:t>7/15/2016</a:t>
+              <a:t>7/18/2016</a:t>
             </a:fld>
             <a:endParaRPr lang="en-US"/>
           </a:p>
@@ -1237,7 +1242,7 @@
           <a:p>
             <a:fld id="{13F2DEAA-2609-498B-866E-7E372419543E}" type="datetimeFigureOut">
               <a:rPr lang="en-US" smtClean="0"/>
-              <a:t>7/15/2016</a:t>
+              <a:t>7/18/2016</a:t>
             </a:fld>
             <a:endParaRPr lang="en-US"/>
           </a:p>
@@ -1604,7 +1609,7 @@
           <a:p>
             <a:fld id="{13F2DEAA-2609-498B-866E-7E372419543E}" type="datetimeFigureOut">
               <a:rPr lang="en-US" smtClean="0"/>
-              <a:t>7/15/2016</a:t>
+              <a:t>7/18/2016</a:t>
             </a:fld>
             <a:endParaRPr lang="en-US"/>
           </a:p>
@@ -1722,7 +1727,7 @@
           <a:p>
             <a:fld id="{13F2DEAA-2609-498B-866E-7E372419543E}" type="datetimeFigureOut">
               <a:rPr lang="en-US" smtClean="0"/>
-              <a:t>7/15/2016</a:t>
+              <a:t>7/18/2016</a:t>
             </a:fld>
             <a:endParaRPr lang="en-US"/>
           </a:p>
@@ -1817,7 +1822,7 @@
           <a:p>
             <a:fld id="{13F2DEAA-2609-498B-866E-7E372419543E}" type="datetimeFigureOut">
               <a:rPr lang="en-US" smtClean="0"/>
-              <a:t>7/15/2016</a:t>
+              <a:t>7/18/2016</a:t>
             </a:fld>
             <a:endParaRPr lang="en-US"/>
           </a:p>
@@ -2094,7 +2099,7 @@
           <a:p>
             <a:fld id="{13F2DEAA-2609-498B-866E-7E372419543E}" type="datetimeFigureOut">
               <a:rPr lang="en-US" smtClean="0"/>
-              <a:t>7/15/2016</a:t>
+              <a:t>7/18/2016</a:t>
             </a:fld>
             <a:endParaRPr lang="en-US"/>
           </a:p>
@@ -2351,7 +2356,7 @@
           <a:p>
             <a:fld id="{13F2DEAA-2609-498B-866E-7E372419543E}" type="datetimeFigureOut">
               <a:rPr lang="en-US" smtClean="0"/>
-              <a:t>7/15/2016</a:t>
+              <a:t>7/18/2016</a:t>
             </a:fld>
             <a:endParaRPr lang="en-US"/>
           </a:p>
@@ -2564,7 +2569,7 @@
           <a:p>
             <a:fld id="{13F2DEAA-2609-498B-866E-7E372419543E}" type="datetimeFigureOut">
               <a:rPr lang="en-US" smtClean="0"/>
-              <a:t>7/15/2016</a:t>
+              <a:t>7/18/2016</a:t>
             </a:fld>
             <a:endParaRPr lang="en-US"/>
           </a:p>
@@ -2983,6 +2988,20 @@
           <a:prstGeom prst="ellipse">
             <a:avLst/>
           </a:prstGeom>
+          <a:solidFill>
+            <a:schemeClr val="accent1">
+              <a:lumMod val="20000"/>
+              <a:lumOff val="80000"/>
+            </a:schemeClr>
+          </a:solidFill>
+          <a:ln>
+            <a:solidFill>
+              <a:schemeClr val="accent1">
+                <a:lumMod val="60000"/>
+                <a:lumOff val="40000"/>
+              </a:schemeClr>
+            </a:solidFill>
+          </a:ln>
         </p:spPr>
         <p:style>
           <a:lnRef idx="2">
@@ -3004,48 +3023,35 @@
           <a:bodyPr rtlCol="0" anchor="ctr"/>
           <a:lstStyle/>
           <a:p>
-            <a:pPr algn="ctr"/>
-            <a:endParaRPr lang="en-US"/>
-          </a:p>
-        </p:txBody>
-      </p:sp>
-      <p:sp>
-        <p:nvSpPr>
-          <p:cNvPr id="6" name="Oval 5"/>
-          <p:cNvSpPr/>
-          <p:nvPr/>
-        </p:nvSpPr>
-        <p:spPr>
-          <a:xfrm>
-            <a:off x="2723027" y="904327"/>
-            <a:ext cx="659757" cy="405114"/>
-          </a:xfrm>
-          <a:prstGeom prst="ellipse">
-            <a:avLst/>
-          </a:prstGeom>
-        </p:spPr>
-        <p:style>
-          <a:lnRef idx="2">
-            <a:schemeClr val="accent1">
-              <a:shade val="50000"/>
-            </a:schemeClr>
-          </a:lnRef>
-          <a:fillRef idx="1">
-            <a:schemeClr val="accent1"/>
-          </a:fillRef>
-          <a:effectRef idx="0">
-            <a:schemeClr val="accent1"/>
-          </a:effectRef>
-          <a:fontRef idx="minor">
-            <a:schemeClr val="lt1"/>
-          </a:fontRef>
-        </p:style>
-        <p:txBody>
-          <a:bodyPr rtlCol="0" anchor="ctr"/>
-          <a:lstStyle/>
-          <a:p>
-            <a:pPr algn="ctr"/>
-            <a:endParaRPr lang="en-US"/>
+            <a:r>
+              <a:rPr lang="en-US" sz="500" dirty="0" smtClean="0">
+                <a:ln w="0"/>
+                <a:solidFill>
+                  <a:schemeClr val="tx1"/>
+                </a:solidFill>
+                <a:effectLst>
+                  <a:outerShdw blurRad="38100" dist="19050" dir="2700000" algn="tl" rotWithShape="0">
+                    <a:schemeClr val="dk1">
+                      <a:alpha val="40000"/>
+                    </a:schemeClr>
+                  </a:outerShdw>
+                </a:effectLst>
+              </a:rPr>
+              <a:t>Doorway to this passage opens</a:t>
+            </a:r>
+            <a:endParaRPr lang="en-US" sz="500" dirty="0">
+              <a:ln w="0"/>
+              <a:solidFill>
+                <a:schemeClr val="tx1"/>
+              </a:solidFill>
+              <a:effectLst>
+                <a:outerShdw blurRad="38100" dist="19050" dir="2700000" algn="tl" rotWithShape="0">
+                  <a:schemeClr val="dk1">
+                    <a:alpha val="40000"/>
+                  </a:schemeClr>
+                </a:outerShdw>
+              </a:effectLst>
+            </a:endParaRPr>
           </a:p>
         </p:txBody>
       </p:sp>
@@ -3057,12 +3063,26 @@
         </p:nvSpPr>
         <p:spPr>
           <a:xfrm>
-            <a:off x="4446609" y="893180"/>
+            <a:off x="4620590" y="941882"/>
             <a:ext cx="659757" cy="405114"/>
           </a:xfrm>
           <a:prstGeom prst="ellipse">
             <a:avLst/>
           </a:prstGeom>
+          <a:solidFill>
+            <a:schemeClr val="accent1">
+              <a:lumMod val="20000"/>
+              <a:lumOff val="80000"/>
+            </a:schemeClr>
+          </a:solidFill>
+          <a:ln>
+            <a:solidFill>
+              <a:schemeClr val="accent1">
+                <a:lumMod val="60000"/>
+                <a:lumOff val="40000"/>
+              </a:schemeClr>
+            </a:solidFill>
+          </a:ln>
         </p:spPr>
         <p:style>
           <a:lnRef idx="2">
@@ -3084,8 +3104,35 @@
           <a:bodyPr rtlCol="0" anchor="ctr"/>
           <a:lstStyle/>
           <a:p>
-            <a:pPr algn="ctr"/>
-            <a:endParaRPr lang="en-US"/>
+            <a:r>
+              <a:rPr lang="en-US" sz="500" dirty="0" smtClean="0">
+                <a:ln w="0"/>
+                <a:solidFill>
+                  <a:schemeClr val="tx1"/>
+                </a:solidFill>
+                <a:effectLst>
+                  <a:outerShdw blurRad="38100" dist="19050" dir="2700000" algn="tl" rotWithShape="0">
+                    <a:schemeClr val="dk1">
+                      <a:alpha val="40000"/>
+                    </a:schemeClr>
+                  </a:outerShdw>
+                </a:effectLst>
+              </a:rPr>
+              <a:t>Enter a  room with several switches and a giant window</a:t>
+            </a:r>
+            <a:endParaRPr lang="en-US" sz="500" dirty="0">
+              <a:ln w="0"/>
+              <a:solidFill>
+                <a:schemeClr val="tx1"/>
+              </a:solidFill>
+              <a:effectLst>
+                <a:outerShdw blurRad="38100" dist="19050" dir="2700000" algn="tl" rotWithShape="0">
+                  <a:schemeClr val="dk1">
+                    <a:alpha val="40000"/>
+                  </a:schemeClr>
+                </a:outerShdw>
+              </a:effectLst>
+            </a:endParaRPr>
           </a:p>
         </p:txBody>
       </p:sp>
@@ -3097,12 +3144,26 @@
         </p:nvSpPr>
         <p:spPr>
           <a:xfrm>
-            <a:off x="3975904" y="1668684"/>
+            <a:off x="3955354" y="2435508"/>
             <a:ext cx="659757" cy="405114"/>
           </a:xfrm>
           <a:prstGeom prst="ellipse">
             <a:avLst/>
           </a:prstGeom>
+          <a:solidFill>
+            <a:schemeClr val="accent1">
+              <a:lumMod val="20000"/>
+              <a:lumOff val="80000"/>
+            </a:schemeClr>
+          </a:solidFill>
+          <a:ln>
+            <a:solidFill>
+              <a:schemeClr val="accent1">
+                <a:lumMod val="60000"/>
+                <a:lumOff val="40000"/>
+              </a:schemeClr>
+            </a:solidFill>
+          </a:ln>
         </p:spPr>
         <p:style>
           <a:lnRef idx="2">
@@ -3124,48 +3185,35 @@
           <a:bodyPr rtlCol="0" anchor="ctr"/>
           <a:lstStyle/>
           <a:p>
-            <a:pPr algn="ctr"/>
-            <a:endParaRPr lang="en-US"/>
-          </a:p>
-        </p:txBody>
-      </p:sp>
-      <p:sp>
-        <p:nvSpPr>
-          <p:cNvPr id="9" name="Oval 8"/>
-          <p:cNvSpPr/>
-          <p:nvPr/>
-        </p:nvSpPr>
-        <p:spPr>
-          <a:xfrm>
-            <a:off x="4965540" y="1668684"/>
-            <a:ext cx="659757" cy="405114"/>
-          </a:xfrm>
-          <a:prstGeom prst="ellipse">
-            <a:avLst/>
-          </a:prstGeom>
-        </p:spPr>
-        <p:style>
-          <a:lnRef idx="2">
-            <a:schemeClr val="accent1">
-              <a:shade val="50000"/>
-            </a:schemeClr>
-          </a:lnRef>
-          <a:fillRef idx="1">
-            <a:schemeClr val="accent1"/>
-          </a:fillRef>
-          <a:effectRef idx="0">
-            <a:schemeClr val="accent1"/>
-          </a:effectRef>
-          <a:fontRef idx="minor">
-            <a:schemeClr val="lt1"/>
-          </a:fontRef>
-        </p:style>
-        <p:txBody>
-          <a:bodyPr rtlCol="0" anchor="ctr"/>
-          <a:lstStyle/>
-          <a:p>
-            <a:pPr algn="ctr"/>
-            <a:endParaRPr lang="en-US"/>
+            <a:r>
+              <a:rPr lang="en-US" sz="500" dirty="0" smtClean="0">
+                <a:ln w="0"/>
+                <a:solidFill>
+                  <a:schemeClr val="tx1"/>
+                </a:solidFill>
+                <a:effectLst>
+                  <a:outerShdw blurRad="38100" dist="19050" dir="2700000" algn="tl" rotWithShape="0">
+                    <a:schemeClr val="dk1">
+                      <a:alpha val="40000"/>
+                    </a:schemeClr>
+                  </a:outerShdw>
+                </a:effectLst>
+              </a:rPr>
+              <a:t>You see all of the paired animals of Dr. CG</a:t>
+            </a:r>
+            <a:endParaRPr lang="en-US" sz="500" dirty="0">
+              <a:ln w="0"/>
+              <a:solidFill>
+                <a:schemeClr val="tx1"/>
+              </a:solidFill>
+              <a:effectLst>
+                <a:outerShdw blurRad="38100" dist="19050" dir="2700000" algn="tl" rotWithShape="0">
+                  <a:schemeClr val="dk1">
+                    <a:alpha val="40000"/>
+                  </a:schemeClr>
+                </a:outerShdw>
+              </a:effectLst>
+            </a:endParaRPr>
           </a:p>
         </p:txBody>
       </p:sp>
@@ -3180,8 +3228,8 @@
         </p:nvCxnSpPr>
         <p:spPr>
           <a:xfrm flipH="1">
-            <a:off x="4305783" y="1238966"/>
-            <a:ext cx="237445" cy="429718"/>
+            <a:off x="4285233" y="1287668"/>
+            <a:ext cx="431976" cy="1147840"/>
           </a:xfrm>
           <a:prstGeom prst="straightConnector1">
             <a:avLst/>
@@ -3210,14 +3258,14 @@
           <p:cNvPr id="13" name="Straight Arrow Connector 12"/>
           <p:cNvCxnSpPr>
             <a:stCxn id="7" idx="5"/>
-            <a:endCxn id="9" idx="0"/>
+            <a:endCxn id="60" idx="0"/>
           </p:cNvCxnSpPr>
           <p:nvPr/>
         </p:nvCxnSpPr>
         <p:spPr>
           <a:xfrm>
-            <a:off x="5009747" y="1238966"/>
-            <a:ext cx="285672" cy="429718"/>
+            <a:off x="5183728" y="1287668"/>
+            <a:ext cx="155898" cy="1117938"/>
           </a:xfrm>
           <a:prstGeom prst="straightConnector1">
             <a:avLst/>
@@ -3246,14 +3294,14 @@
           <p:cNvPr id="19" name="Straight Arrow Connector 18"/>
           <p:cNvCxnSpPr>
             <a:stCxn id="5" idx="3"/>
-            <a:endCxn id="6" idx="0"/>
+            <a:endCxn id="23" idx="0"/>
           </p:cNvCxnSpPr>
           <p:nvPr/>
         </p:nvCxnSpPr>
         <p:spPr>
           <a:xfrm flipH="1">
-            <a:off x="3052906" y="669877"/>
-            <a:ext cx="689739" cy="234450"/>
+            <a:off x="2720052" y="669877"/>
+            <a:ext cx="1022593" cy="185904"/>
           </a:xfrm>
           <a:prstGeom prst="straightConnector1">
             <a:avLst/>
@@ -3289,7 +3337,7 @@
         <p:spPr>
           <a:xfrm>
             <a:off x="4209164" y="669877"/>
-            <a:ext cx="567324" cy="223303"/>
+            <a:ext cx="741305" cy="272005"/>
           </a:xfrm>
           <a:prstGeom prst="straightConnector1">
             <a:avLst/>
@@ -3321,12 +3369,26 @@
         </p:nvSpPr>
         <p:spPr>
           <a:xfrm>
-            <a:off x="2197523" y="1657369"/>
+            <a:off x="2390173" y="855781"/>
             <a:ext cx="659757" cy="405114"/>
           </a:xfrm>
           <a:prstGeom prst="ellipse">
             <a:avLst/>
           </a:prstGeom>
+          <a:solidFill>
+            <a:schemeClr val="accent1">
+              <a:lumMod val="20000"/>
+              <a:lumOff val="80000"/>
+            </a:schemeClr>
+          </a:solidFill>
+          <a:ln>
+            <a:solidFill>
+              <a:schemeClr val="accent1">
+                <a:lumMod val="60000"/>
+                <a:lumOff val="40000"/>
+              </a:schemeClr>
+            </a:solidFill>
+          </a:ln>
         </p:spPr>
         <p:style>
           <a:lnRef idx="2">
@@ -3348,8 +3410,19 @@
           <a:bodyPr rtlCol="0" anchor="ctr"/>
           <a:lstStyle/>
           <a:p>
-            <a:pPr algn="ctr"/>
-            <a:endParaRPr lang="en-US"/>
+            <a:endParaRPr lang="en-US" sz="500">
+              <a:ln w="0"/>
+              <a:solidFill>
+                <a:schemeClr val="tx1"/>
+              </a:solidFill>
+              <a:effectLst>
+                <a:outerShdw blurRad="38100" dist="19050" dir="2700000" algn="tl" rotWithShape="0">
+                  <a:schemeClr val="dk1">
+                    <a:alpha val="40000"/>
+                  </a:schemeClr>
+                </a:outerShdw>
+              </a:effectLst>
+            </a:endParaRPr>
           </a:p>
         </p:txBody>
       </p:sp>
@@ -3367,6 +3440,20 @@
           <a:prstGeom prst="ellipse">
             <a:avLst/>
           </a:prstGeom>
+          <a:solidFill>
+            <a:schemeClr val="accent1">
+              <a:lumMod val="20000"/>
+              <a:lumOff val="80000"/>
+            </a:schemeClr>
+          </a:solidFill>
+          <a:ln>
+            <a:solidFill>
+              <a:schemeClr val="accent1">
+                <a:lumMod val="60000"/>
+                <a:lumOff val="40000"/>
+              </a:schemeClr>
+            </a:solidFill>
+          </a:ln>
         </p:spPr>
         <p:style>
           <a:lnRef idx="2">
@@ -3388,8 +3475,19 @@
           <a:bodyPr rtlCol="0" anchor="ctr"/>
           <a:lstStyle/>
           <a:p>
-            <a:pPr algn="ctr"/>
-            <a:endParaRPr lang="en-US"/>
+            <a:endParaRPr lang="en-US" sz="500">
+              <a:ln w="0"/>
+              <a:solidFill>
+                <a:schemeClr val="tx1"/>
+              </a:solidFill>
+              <a:effectLst>
+                <a:outerShdw blurRad="38100" dist="19050" dir="2700000" algn="tl" rotWithShape="0">
+                  <a:schemeClr val="dk1">
+                    <a:alpha val="40000"/>
+                  </a:schemeClr>
+                </a:outerShdw>
+              </a:effectLst>
+            </a:endParaRPr>
           </a:p>
         </p:txBody>
       </p:sp>
@@ -3407,6 +3505,20 @@
           <a:prstGeom prst="ellipse">
             <a:avLst/>
           </a:prstGeom>
+          <a:solidFill>
+            <a:schemeClr val="accent1">
+              <a:lumMod val="20000"/>
+              <a:lumOff val="80000"/>
+            </a:schemeClr>
+          </a:solidFill>
+          <a:ln>
+            <a:solidFill>
+              <a:schemeClr val="accent1">
+                <a:lumMod val="60000"/>
+                <a:lumOff val="40000"/>
+              </a:schemeClr>
+            </a:solidFill>
+          </a:ln>
         </p:spPr>
         <p:style>
           <a:lnRef idx="2">
@@ -3428,8 +3540,19 @@
           <a:bodyPr rtlCol="0" anchor="ctr"/>
           <a:lstStyle/>
           <a:p>
-            <a:pPr algn="ctr"/>
-            <a:endParaRPr lang="en-US"/>
+            <a:endParaRPr lang="en-US" sz="500">
+              <a:ln w="0"/>
+              <a:solidFill>
+                <a:schemeClr val="tx1"/>
+              </a:solidFill>
+              <a:effectLst>
+                <a:outerShdw blurRad="38100" dist="19050" dir="2700000" algn="tl" rotWithShape="0">
+                  <a:schemeClr val="dk1">
+                    <a:alpha val="40000"/>
+                  </a:schemeClr>
+                </a:outerShdw>
+              </a:effectLst>
+            </a:endParaRPr>
           </a:p>
         </p:txBody>
       </p:sp>
@@ -3444,8 +3567,8 @@
         </p:nvCxnSpPr>
         <p:spPr>
           <a:xfrm flipH="1">
-            <a:off x="1558244" y="2003155"/>
-            <a:ext cx="735898" cy="500361"/>
+            <a:off x="1558244" y="1201567"/>
+            <a:ext cx="928548" cy="1301949"/>
           </a:xfrm>
           <a:prstGeom prst="straightConnector1">
             <a:avLst/>
@@ -3480,8 +3603,8 @@
         </p:nvCxnSpPr>
         <p:spPr>
           <a:xfrm>
-            <a:off x="2760661" y="2003155"/>
-            <a:ext cx="585873" cy="521365"/>
+            <a:off x="2953311" y="1201567"/>
+            <a:ext cx="393223" cy="1322953"/>
           </a:xfrm>
           <a:prstGeom prst="straightConnector1">
             <a:avLst/>
@@ -3505,135 +3628,19 @@
           </a:fontRef>
         </p:style>
       </p:cxnSp>
-      <p:cxnSp>
-        <p:nvCxnSpPr>
-          <p:cNvPr id="36" name="Straight Arrow Connector 35"/>
-          <p:cNvCxnSpPr>
-            <a:stCxn id="6" idx="4"/>
-            <a:endCxn id="23" idx="0"/>
-          </p:cNvCxnSpPr>
-          <p:nvPr/>
-        </p:nvCxnSpPr>
-        <p:spPr>
-          <a:xfrm flipH="1">
-            <a:off x="2527402" y="1309441"/>
-            <a:ext cx="525504" cy="347928"/>
-          </a:xfrm>
-          <a:prstGeom prst="straightConnector1">
-            <a:avLst/>
-          </a:prstGeom>
-          <a:ln>
-            <a:tailEnd type="triangle"/>
-          </a:ln>
-        </p:spPr>
-        <p:style>
-          <a:lnRef idx="1">
-            <a:schemeClr val="accent1"/>
-          </a:lnRef>
-          <a:fillRef idx="0">
-            <a:schemeClr val="accent1"/>
-          </a:fillRef>
-          <a:effectRef idx="0">
-            <a:schemeClr val="accent1"/>
-          </a:effectRef>
-          <a:fontRef idx="minor">
-            <a:schemeClr val="tx1"/>
-          </a:fontRef>
-        </p:style>
-      </p:cxnSp>
-      <p:sp>
-        <p:nvSpPr>
-          <p:cNvPr id="37" name="Oval 36"/>
-          <p:cNvSpPr/>
-          <p:nvPr/>
-        </p:nvSpPr>
-        <p:spPr>
-          <a:xfrm>
-            <a:off x="818911" y="3431675"/>
-            <a:ext cx="659757" cy="405114"/>
-          </a:xfrm>
-          <a:prstGeom prst="ellipse">
-            <a:avLst/>
-          </a:prstGeom>
-        </p:spPr>
-        <p:style>
-          <a:lnRef idx="2">
-            <a:schemeClr val="accent1">
-              <a:shade val="50000"/>
-            </a:schemeClr>
-          </a:lnRef>
-          <a:fillRef idx="1">
-            <a:schemeClr val="accent1"/>
-          </a:fillRef>
-          <a:effectRef idx="0">
-            <a:schemeClr val="accent1"/>
-          </a:effectRef>
-          <a:fontRef idx="minor">
-            <a:schemeClr val="lt1"/>
-          </a:fontRef>
-        </p:style>
-        <p:txBody>
-          <a:bodyPr rtlCol="0" anchor="ctr"/>
-          <a:lstStyle/>
-          <a:p>
-            <a:pPr algn="ctr"/>
-            <a:endParaRPr lang="en-US"/>
-          </a:p>
-        </p:txBody>
-      </p:sp>
-      <p:sp>
-        <p:nvSpPr>
-          <p:cNvPr id="38" name="Oval 37"/>
-          <p:cNvSpPr/>
-          <p:nvPr/>
-        </p:nvSpPr>
-        <p:spPr>
-          <a:xfrm>
-            <a:off x="1649394" y="3431675"/>
-            <a:ext cx="659757" cy="405114"/>
-          </a:xfrm>
-          <a:prstGeom prst="ellipse">
-            <a:avLst/>
-          </a:prstGeom>
-        </p:spPr>
-        <p:style>
-          <a:lnRef idx="2">
-            <a:schemeClr val="accent1">
-              <a:shade val="50000"/>
-            </a:schemeClr>
-          </a:lnRef>
-          <a:fillRef idx="1">
-            <a:schemeClr val="accent1"/>
-          </a:fillRef>
-          <a:effectRef idx="0">
-            <a:schemeClr val="accent1"/>
-          </a:effectRef>
-          <a:fontRef idx="minor">
-            <a:schemeClr val="lt1"/>
-          </a:fontRef>
-        </p:style>
-        <p:txBody>
-          <a:bodyPr rtlCol="0" anchor="ctr"/>
-          <a:lstStyle/>
-          <a:p>
-            <a:pPr algn="ctr"/>
-            <a:endParaRPr lang="en-US"/>
-          </a:p>
-        </p:txBody>
-      </p:sp>
       <p:cxnSp>
         <p:nvCxnSpPr>
           <p:cNvPr id="39" name="Straight Arrow Connector 38"/>
           <p:cNvCxnSpPr>
             <a:stCxn id="25" idx="3"/>
-            <a:endCxn id="37" idx="0"/>
+            <a:endCxn id="68" idx="0"/>
           </p:cNvCxnSpPr>
           <p:nvPr/>
         </p:nvCxnSpPr>
         <p:spPr>
           <a:xfrm flipH="1">
-            <a:off x="1148790" y="2849302"/>
-            <a:ext cx="176194" cy="582373"/>
+            <a:off x="1070509" y="2849302"/>
+            <a:ext cx="254475" cy="532792"/>
           </a:xfrm>
           <a:prstGeom prst="straightConnector1">
             <a:avLst/>
@@ -3662,14 +3669,14 @@
           <p:cNvPr id="40" name="Straight Arrow Connector 39"/>
           <p:cNvCxnSpPr>
             <a:stCxn id="25" idx="5"/>
-            <a:endCxn id="38" idx="0"/>
+            <a:endCxn id="81" idx="0"/>
           </p:cNvCxnSpPr>
           <p:nvPr/>
         </p:nvCxnSpPr>
         <p:spPr>
           <a:xfrm>
             <a:off x="1791503" y="2849302"/>
-            <a:ext cx="187770" cy="582373"/>
+            <a:ext cx="122932" cy="485663"/>
           </a:xfrm>
           <a:prstGeom prst="straightConnector1">
             <a:avLst/>
@@ -3701,12 +3708,26 @@
         </p:nvSpPr>
         <p:spPr>
           <a:xfrm>
-            <a:off x="2390173" y="3442995"/>
+            <a:off x="2551042" y="3350253"/>
             <a:ext cx="659757" cy="405114"/>
           </a:xfrm>
           <a:prstGeom prst="ellipse">
             <a:avLst/>
           </a:prstGeom>
+          <a:solidFill>
+            <a:schemeClr val="accent1">
+              <a:lumMod val="20000"/>
+              <a:lumOff val="80000"/>
+            </a:schemeClr>
+          </a:solidFill>
+          <a:ln>
+            <a:solidFill>
+              <a:schemeClr val="accent1">
+                <a:lumMod val="60000"/>
+                <a:lumOff val="40000"/>
+              </a:schemeClr>
+            </a:solidFill>
+          </a:ln>
         </p:spPr>
         <p:style>
           <a:lnRef idx="2">
@@ -3728,8 +3749,19 @@
           <a:bodyPr rtlCol="0" anchor="ctr"/>
           <a:lstStyle/>
           <a:p>
-            <a:pPr algn="ctr"/>
-            <a:endParaRPr lang="en-US"/>
+            <a:endParaRPr lang="en-US" sz="500">
+              <a:ln w="0"/>
+              <a:solidFill>
+                <a:schemeClr val="tx1"/>
+              </a:solidFill>
+              <a:effectLst>
+                <a:outerShdw blurRad="38100" dist="19050" dir="2700000" algn="tl" rotWithShape="0">
+                  <a:schemeClr val="dk1">
+                    <a:alpha val="40000"/>
+                  </a:schemeClr>
+                </a:outerShdw>
+              </a:effectLst>
+            </a:endParaRPr>
           </a:p>
         </p:txBody>
       </p:sp>
@@ -3747,6 +3779,20 @@
           <a:prstGeom prst="ellipse">
             <a:avLst/>
           </a:prstGeom>
+          <a:solidFill>
+            <a:schemeClr val="accent1">
+              <a:lumMod val="20000"/>
+              <a:lumOff val="80000"/>
+            </a:schemeClr>
+          </a:solidFill>
+          <a:ln>
+            <a:solidFill>
+              <a:schemeClr val="accent1">
+                <a:lumMod val="60000"/>
+                <a:lumOff val="40000"/>
+              </a:schemeClr>
+            </a:solidFill>
+          </a:ln>
         </p:spPr>
         <p:style>
           <a:lnRef idx="2">
@@ -3768,8 +3814,19 @@
           <a:bodyPr rtlCol="0" anchor="ctr"/>
           <a:lstStyle/>
           <a:p>
-            <a:pPr algn="ctr"/>
-            <a:endParaRPr lang="en-US"/>
+            <a:endParaRPr lang="en-US" sz="500">
+              <a:ln w="0"/>
+              <a:solidFill>
+                <a:schemeClr val="tx1"/>
+              </a:solidFill>
+              <a:effectLst>
+                <a:outerShdw blurRad="38100" dist="19050" dir="2700000" algn="tl" rotWithShape="0">
+                  <a:schemeClr val="dk1">
+                    <a:alpha val="40000"/>
+                  </a:schemeClr>
+                </a:outerShdw>
+              </a:effectLst>
+            </a:endParaRPr>
           </a:p>
         </p:txBody>
       </p:sp>
@@ -3784,8 +3841,8 @@
         </p:nvCxnSpPr>
         <p:spPr>
           <a:xfrm flipH="1">
-            <a:off x="2720052" y="2870306"/>
-            <a:ext cx="393222" cy="572689"/>
+            <a:off x="2880921" y="2870306"/>
+            <a:ext cx="232353" cy="479947"/>
           </a:xfrm>
           <a:prstGeom prst="straightConnector1">
             <a:avLst/>
@@ -3847,82 +3904,6 @@
       </p:cxnSp>
       <p:sp>
         <p:nvSpPr>
-          <p:cNvPr id="56" name="Oval 55"/>
-          <p:cNvSpPr/>
-          <p:nvPr/>
-        </p:nvSpPr>
-        <p:spPr>
-          <a:xfrm>
-            <a:off x="3957492" y="2384166"/>
-            <a:ext cx="659757" cy="405114"/>
-          </a:xfrm>
-          <a:prstGeom prst="ellipse">
-            <a:avLst/>
-          </a:prstGeom>
-        </p:spPr>
-        <p:style>
-          <a:lnRef idx="2">
-            <a:schemeClr val="accent1">
-              <a:shade val="50000"/>
-            </a:schemeClr>
-          </a:lnRef>
-          <a:fillRef idx="1">
-            <a:schemeClr val="accent1"/>
-          </a:fillRef>
-          <a:effectRef idx="0">
-            <a:schemeClr val="accent1"/>
-          </a:effectRef>
-          <a:fontRef idx="minor">
-            <a:schemeClr val="lt1"/>
-          </a:fontRef>
-        </p:style>
-        <p:txBody>
-          <a:bodyPr rtlCol="0" anchor="ctr"/>
-          <a:lstStyle/>
-          <a:p>
-            <a:pPr algn="ctr"/>
-            <a:endParaRPr lang="en-US"/>
-          </a:p>
-        </p:txBody>
-      </p:sp>
-      <p:cxnSp>
-        <p:nvCxnSpPr>
-          <p:cNvPr id="58" name="Straight Arrow Connector 57"/>
-          <p:cNvCxnSpPr>
-            <a:stCxn id="8" idx="4"/>
-            <a:endCxn id="56" idx="0"/>
-          </p:cNvCxnSpPr>
-          <p:nvPr/>
-        </p:nvCxnSpPr>
-        <p:spPr>
-          <a:xfrm flipH="1">
-            <a:off x="4287371" y="2073798"/>
-            <a:ext cx="18412" cy="310368"/>
-          </a:xfrm>
-          <a:prstGeom prst="straightConnector1">
-            <a:avLst/>
-          </a:prstGeom>
-          <a:ln>
-            <a:tailEnd type="triangle"/>
-          </a:ln>
-        </p:spPr>
-        <p:style>
-          <a:lnRef idx="1">
-            <a:schemeClr val="accent1"/>
-          </a:lnRef>
-          <a:fillRef idx="0">
-            <a:schemeClr val="accent1"/>
-          </a:fillRef>
-          <a:effectRef idx="0">
-            <a:schemeClr val="accent1"/>
-          </a:effectRef>
-          <a:fontRef idx="minor">
-            <a:schemeClr val="tx1"/>
-          </a:fontRef>
-        </p:style>
-      </p:cxnSp>
-      <p:sp>
-        <p:nvSpPr>
           <p:cNvPr id="60" name="Oval 59"/>
           <p:cNvSpPr/>
           <p:nvPr/>
@@ -3935,6 +3916,20 @@
           <a:prstGeom prst="ellipse">
             <a:avLst/>
           </a:prstGeom>
+          <a:solidFill>
+            <a:schemeClr val="accent1">
+              <a:lumMod val="20000"/>
+              <a:lumOff val="80000"/>
+            </a:schemeClr>
+          </a:solidFill>
+          <a:ln>
+            <a:solidFill>
+              <a:schemeClr val="accent1">
+                <a:lumMod val="60000"/>
+                <a:lumOff val="40000"/>
+              </a:schemeClr>
+            </a:solidFill>
+          </a:ln>
         </p:spPr>
         <p:style>
           <a:lnRef idx="2">
@@ -3956,8 +3951,35 @@
           <a:bodyPr rtlCol="0" anchor="ctr"/>
           <a:lstStyle/>
           <a:p>
-            <a:pPr algn="ctr"/>
-            <a:endParaRPr lang="en-US"/>
+            <a:r>
+              <a:rPr lang="en-US" sz="500" dirty="0" smtClean="0">
+                <a:ln w="0"/>
+                <a:solidFill>
+                  <a:schemeClr val="tx1"/>
+                </a:solidFill>
+                <a:effectLst>
+                  <a:outerShdw blurRad="38100" dist="19050" dir="2700000" algn="tl" rotWithShape="0">
+                    <a:schemeClr val="dk1">
+                      <a:alpha val="40000"/>
+                    </a:schemeClr>
+                  </a:outerShdw>
+                </a:effectLst>
+              </a:rPr>
+              <a:t>Three notable options: present itself</a:t>
+            </a:r>
+            <a:endParaRPr lang="en-US" sz="500" dirty="0">
+              <a:ln w="0"/>
+              <a:solidFill>
+                <a:schemeClr val="tx1"/>
+              </a:solidFill>
+              <a:effectLst>
+                <a:outerShdw blurRad="38100" dist="19050" dir="2700000" algn="tl" rotWithShape="0">
+                  <a:schemeClr val="dk1">
+                    <a:alpha val="40000"/>
+                  </a:schemeClr>
+                </a:outerShdw>
+              </a:effectLst>
+            </a:endParaRPr>
           </a:p>
         </p:txBody>
       </p:sp>
@@ -3975,6 +3997,20 @@
           <a:prstGeom prst="ellipse">
             <a:avLst/>
           </a:prstGeom>
+          <a:solidFill>
+            <a:schemeClr val="accent1">
+              <a:lumMod val="20000"/>
+              <a:lumOff val="80000"/>
+            </a:schemeClr>
+          </a:solidFill>
+          <a:ln>
+            <a:solidFill>
+              <a:schemeClr val="accent1">
+                <a:lumMod val="60000"/>
+                <a:lumOff val="40000"/>
+              </a:schemeClr>
+            </a:solidFill>
+          </a:ln>
         </p:spPr>
         <p:style>
           <a:lnRef idx="2">
@@ -3996,48 +4032,19 @@
           <a:bodyPr rtlCol="0" anchor="ctr"/>
           <a:lstStyle/>
           <a:p>
-            <a:pPr algn="ctr"/>
-            <a:endParaRPr lang="en-US"/>
-          </a:p>
-        </p:txBody>
-      </p:sp>
-      <p:sp>
-        <p:nvSpPr>
-          <p:cNvPr id="62" name="Oval 61"/>
-          <p:cNvSpPr/>
-          <p:nvPr/>
-        </p:nvSpPr>
-        <p:spPr>
-          <a:xfrm>
-            <a:off x="5489052" y="3323645"/>
-            <a:ext cx="659757" cy="405114"/>
-          </a:xfrm>
-          <a:prstGeom prst="ellipse">
-            <a:avLst/>
-          </a:prstGeom>
-        </p:spPr>
-        <p:style>
-          <a:lnRef idx="2">
-            <a:schemeClr val="accent1">
-              <a:shade val="50000"/>
-            </a:schemeClr>
-          </a:lnRef>
-          <a:fillRef idx="1">
-            <a:schemeClr val="accent1"/>
-          </a:fillRef>
-          <a:effectRef idx="0">
-            <a:schemeClr val="accent1"/>
-          </a:effectRef>
-          <a:fontRef idx="minor">
-            <a:schemeClr val="lt1"/>
-          </a:fontRef>
-        </p:style>
-        <p:txBody>
-          <a:bodyPr rtlCol="0" anchor="ctr"/>
-          <a:lstStyle/>
-          <a:p>
-            <a:pPr algn="ctr"/>
-            <a:endParaRPr lang="en-US"/>
+            <a:endParaRPr lang="en-US" sz="500">
+              <a:ln w="0"/>
+              <a:solidFill>
+                <a:schemeClr val="tx1"/>
+              </a:solidFill>
+              <a:effectLst>
+                <a:outerShdw blurRad="38100" dist="19050" dir="2700000" algn="tl" rotWithShape="0">
+                  <a:schemeClr val="dk1">
+                    <a:alpha val="40000"/>
+                  </a:schemeClr>
+                </a:outerShdw>
+              </a:effectLst>
+            </a:endParaRPr>
           </a:p>
         </p:txBody>
       </p:sp>
@@ -4082,50 +4089,14 @@
           <p:cNvPr id="64" name="Straight Arrow Connector 63"/>
           <p:cNvCxnSpPr>
             <a:stCxn id="60" idx="5"/>
-            <a:endCxn id="62" idx="0"/>
+            <a:endCxn id="91" idx="0"/>
           </p:cNvCxnSpPr>
           <p:nvPr/>
         </p:nvCxnSpPr>
         <p:spPr>
           <a:xfrm>
             <a:off x="5572885" y="2751392"/>
-            <a:ext cx="246046" cy="572253"/>
-          </a:xfrm>
-          <a:prstGeom prst="straightConnector1">
-            <a:avLst/>
-          </a:prstGeom>
-          <a:ln>
-            <a:tailEnd type="triangle"/>
-          </a:ln>
-        </p:spPr>
-        <p:style>
-          <a:lnRef idx="1">
-            <a:schemeClr val="accent1"/>
-          </a:lnRef>
-          <a:fillRef idx="0">
-            <a:schemeClr val="accent1"/>
-          </a:fillRef>
-          <a:effectRef idx="0">
-            <a:schemeClr val="accent1"/>
-          </a:effectRef>
-          <a:fontRef idx="minor">
-            <a:schemeClr val="tx1"/>
-          </a:fontRef>
-        </p:style>
-      </p:cxnSp>
-      <p:cxnSp>
-        <p:nvCxnSpPr>
-          <p:cNvPr id="66" name="Straight Arrow Connector 65"/>
-          <p:cNvCxnSpPr>
-            <a:stCxn id="9" idx="4"/>
-            <a:endCxn id="60" idx="0"/>
-          </p:cNvCxnSpPr>
-          <p:nvPr/>
-        </p:nvCxnSpPr>
-        <p:spPr>
-          <a:xfrm>
-            <a:off x="5295419" y="2073798"/>
-            <a:ext cx="44207" cy="331808"/>
+            <a:ext cx="287660" cy="672802"/>
           </a:xfrm>
           <a:prstGeom prst="straightConnector1">
             <a:avLst/>
@@ -4157,12 +4128,26 @@
         </p:nvSpPr>
         <p:spPr>
           <a:xfrm>
-            <a:off x="796545" y="4396413"/>
+            <a:off x="740630" y="3382094"/>
             <a:ext cx="659757" cy="405114"/>
           </a:xfrm>
           <a:prstGeom prst="ellipse">
             <a:avLst/>
           </a:prstGeom>
+          <a:solidFill>
+            <a:schemeClr val="accent1">
+              <a:lumMod val="20000"/>
+              <a:lumOff val="80000"/>
+            </a:schemeClr>
+          </a:solidFill>
+          <a:ln>
+            <a:solidFill>
+              <a:schemeClr val="accent1">
+                <a:lumMod val="60000"/>
+                <a:lumOff val="40000"/>
+              </a:schemeClr>
+            </a:solidFill>
+          </a:ln>
         </p:spPr>
         <p:style>
           <a:lnRef idx="2">
@@ -4184,8 +4169,19 @@
           <a:bodyPr rtlCol="0" anchor="ctr"/>
           <a:lstStyle/>
           <a:p>
-            <a:pPr algn="ctr"/>
-            <a:endParaRPr lang="en-US"/>
+            <a:endParaRPr lang="en-US" sz="500">
+              <a:ln w="0"/>
+              <a:solidFill>
+                <a:schemeClr val="tx1"/>
+              </a:solidFill>
+              <a:effectLst>
+                <a:outerShdw blurRad="38100" dist="19050" dir="2700000" algn="tl" rotWithShape="0">
+                  <a:schemeClr val="dk1">
+                    <a:alpha val="40000"/>
+                  </a:schemeClr>
+                </a:outerShdw>
+              </a:effectLst>
+            </a:endParaRPr>
           </a:p>
         </p:txBody>
       </p:sp>
@@ -4197,12 +4193,26 @@
         </p:nvSpPr>
         <p:spPr>
           <a:xfrm>
-            <a:off x="107196" y="5218866"/>
+            <a:off x="15863" y="4731543"/>
             <a:ext cx="659757" cy="405114"/>
           </a:xfrm>
           <a:prstGeom prst="ellipse">
             <a:avLst/>
           </a:prstGeom>
+          <a:solidFill>
+            <a:schemeClr val="accent1">
+              <a:lumMod val="20000"/>
+              <a:lumOff val="80000"/>
+            </a:schemeClr>
+          </a:solidFill>
+          <a:ln>
+            <a:solidFill>
+              <a:schemeClr val="accent1">
+                <a:lumMod val="60000"/>
+                <a:lumOff val="40000"/>
+              </a:schemeClr>
+            </a:solidFill>
+          </a:ln>
         </p:spPr>
         <p:style>
           <a:lnRef idx="2">
@@ -4224,8 +4234,19 @@
           <a:bodyPr rtlCol="0" anchor="ctr"/>
           <a:lstStyle/>
           <a:p>
-            <a:pPr algn="ctr"/>
-            <a:endParaRPr lang="en-US"/>
+            <a:endParaRPr lang="en-US" sz="500">
+              <a:ln w="0"/>
+              <a:solidFill>
+                <a:schemeClr val="tx1"/>
+              </a:solidFill>
+              <a:effectLst>
+                <a:outerShdw blurRad="38100" dist="19050" dir="2700000" algn="tl" rotWithShape="0">
+                  <a:schemeClr val="dk1">
+                    <a:alpha val="40000"/>
+                  </a:schemeClr>
+                </a:outerShdw>
+              </a:effectLst>
+            </a:endParaRPr>
           </a:p>
         </p:txBody>
       </p:sp>
@@ -4237,12 +4258,26 @@
         </p:nvSpPr>
         <p:spPr>
           <a:xfrm>
-            <a:off x="1131555" y="5207546"/>
+            <a:off x="1017897" y="4759711"/>
             <a:ext cx="659757" cy="405114"/>
           </a:xfrm>
           <a:prstGeom prst="ellipse">
             <a:avLst/>
           </a:prstGeom>
+          <a:solidFill>
+            <a:schemeClr val="accent1">
+              <a:lumMod val="20000"/>
+              <a:lumOff val="80000"/>
+            </a:schemeClr>
+          </a:solidFill>
+          <a:ln>
+            <a:solidFill>
+              <a:schemeClr val="accent1">
+                <a:lumMod val="60000"/>
+                <a:lumOff val="40000"/>
+              </a:schemeClr>
+            </a:solidFill>
+          </a:ln>
         </p:spPr>
         <p:style>
           <a:lnRef idx="2">
@@ -4264,8 +4299,19 @@
           <a:bodyPr rtlCol="0" anchor="ctr"/>
           <a:lstStyle/>
           <a:p>
-            <a:pPr algn="ctr"/>
-            <a:endParaRPr lang="en-US"/>
+            <a:endParaRPr lang="en-US" sz="500">
+              <a:ln w="0"/>
+              <a:solidFill>
+                <a:schemeClr val="tx1"/>
+              </a:solidFill>
+              <a:effectLst>
+                <a:outerShdw blurRad="38100" dist="19050" dir="2700000" algn="tl" rotWithShape="0">
+                  <a:schemeClr val="dk1">
+                    <a:alpha val="40000"/>
+                  </a:schemeClr>
+                </a:outerShdw>
+              </a:effectLst>
+            </a:endParaRPr>
           </a:p>
         </p:txBody>
       </p:sp>
@@ -4280,8 +4326,8 @@
         </p:nvCxnSpPr>
         <p:spPr>
           <a:xfrm flipH="1">
-            <a:off x="437075" y="4742199"/>
-            <a:ext cx="456089" cy="476667"/>
+            <a:off x="345742" y="3727880"/>
+            <a:ext cx="491507" cy="1003663"/>
           </a:xfrm>
           <a:prstGeom prst="straightConnector1">
             <a:avLst/>
@@ -4316,44 +4362,8 @@
         </p:nvCxnSpPr>
         <p:spPr>
           <a:xfrm>
-            <a:off x="1359683" y="4742199"/>
-            <a:ext cx="101751" cy="465347"/>
-          </a:xfrm>
-          <a:prstGeom prst="straightConnector1">
-            <a:avLst/>
-          </a:prstGeom>
-          <a:ln>
-            <a:tailEnd type="triangle"/>
-          </a:ln>
-        </p:spPr>
-        <p:style>
-          <a:lnRef idx="1">
-            <a:schemeClr val="accent1"/>
-          </a:lnRef>
-          <a:fillRef idx="0">
-            <a:schemeClr val="accent1"/>
-          </a:fillRef>
-          <a:effectRef idx="0">
-            <a:schemeClr val="accent1"/>
-          </a:effectRef>
-          <a:fontRef idx="minor">
-            <a:schemeClr val="tx1"/>
-          </a:fontRef>
-        </p:style>
-      </p:cxnSp>
-      <p:cxnSp>
-        <p:nvCxnSpPr>
-          <p:cNvPr id="79" name="Straight Arrow Connector 78"/>
-          <p:cNvCxnSpPr>
-            <a:stCxn id="37" idx="4"/>
-            <a:endCxn id="68" idx="0"/>
-          </p:cNvCxnSpPr>
-          <p:nvPr/>
-        </p:nvCxnSpPr>
-        <p:spPr>
-          <a:xfrm flipH="1">
-            <a:off x="1126424" y="3836789"/>
-            <a:ext cx="22366" cy="559624"/>
+            <a:off x="1303768" y="3727880"/>
+            <a:ext cx="44008" cy="1031831"/>
           </a:xfrm>
           <a:prstGeom prst="straightConnector1">
             <a:avLst/>
@@ -4385,12 +4395,26 @@
         </p:nvSpPr>
         <p:spPr>
           <a:xfrm>
-            <a:off x="2910511" y="4508083"/>
+            <a:off x="1584556" y="3334965"/>
             <a:ext cx="659757" cy="405114"/>
           </a:xfrm>
           <a:prstGeom prst="ellipse">
             <a:avLst/>
           </a:prstGeom>
+          <a:solidFill>
+            <a:schemeClr val="accent1">
+              <a:lumMod val="20000"/>
+              <a:lumOff val="80000"/>
+            </a:schemeClr>
+          </a:solidFill>
+          <a:ln>
+            <a:solidFill>
+              <a:schemeClr val="accent1">
+                <a:lumMod val="60000"/>
+                <a:lumOff val="40000"/>
+              </a:schemeClr>
+            </a:solidFill>
+          </a:ln>
         </p:spPr>
         <p:style>
           <a:lnRef idx="2">
@@ -4412,274 +4436,22 @@
           <a:bodyPr rtlCol="0" anchor="ctr"/>
           <a:lstStyle/>
           <a:p>
-            <a:pPr algn="ctr"/>
-            <a:endParaRPr lang="en-US"/>
-          </a:p>
-        </p:txBody>
-      </p:sp>
-      <p:cxnSp>
-        <p:nvCxnSpPr>
-          <p:cNvPr id="83" name="Straight Arrow Connector 82"/>
-          <p:cNvCxnSpPr>
-            <a:stCxn id="38" idx="4"/>
-            <a:endCxn id="81" idx="0"/>
-          </p:cNvCxnSpPr>
-          <p:nvPr/>
-        </p:nvCxnSpPr>
-        <p:spPr>
-          <a:xfrm>
-            <a:off x="1979273" y="3836789"/>
-            <a:ext cx="1261117" cy="671294"/>
-          </a:xfrm>
-          <a:prstGeom prst="straightConnector1">
-            <a:avLst/>
-          </a:prstGeom>
-          <a:ln>
-            <a:tailEnd type="triangle"/>
-          </a:ln>
-        </p:spPr>
-        <p:style>
-          <a:lnRef idx="1">
-            <a:schemeClr val="accent1"/>
-          </a:lnRef>
-          <a:fillRef idx="0">
-            <a:schemeClr val="accent1"/>
-          </a:fillRef>
-          <a:effectRef idx="0">
-            <a:schemeClr val="accent1"/>
-          </a:effectRef>
-          <a:fontRef idx="minor">
-            <a:schemeClr val="tx1"/>
-          </a:fontRef>
-        </p:style>
-      </p:cxnSp>
-      <p:sp>
-        <p:nvSpPr>
-          <p:cNvPr id="84" name="Oval 83"/>
-          <p:cNvSpPr/>
-          <p:nvPr/>
-        </p:nvSpPr>
-        <p:spPr>
-          <a:xfrm>
-            <a:off x="5489052" y="4241684"/>
-            <a:ext cx="659757" cy="405114"/>
-          </a:xfrm>
-          <a:prstGeom prst="ellipse">
-            <a:avLst/>
-          </a:prstGeom>
-        </p:spPr>
-        <p:style>
-          <a:lnRef idx="2">
-            <a:schemeClr val="accent1">
-              <a:shade val="50000"/>
-            </a:schemeClr>
-          </a:lnRef>
-          <a:fillRef idx="1">
-            <a:schemeClr val="accent1"/>
-          </a:fillRef>
-          <a:effectRef idx="0">
-            <a:schemeClr val="accent1"/>
-          </a:effectRef>
-          <a:fontRef idx="minor">
-            <a:schemeClr val="lt1"/>
-          </a:fontRef>
-        </p:style>
-        <p:txBody>
-          <a:bodyPr rtlCol="0" anchor="ctr"/>
-          <a:lstStyle/>
-          <a:p>
-            <a:pPr algn="ctr"/>
-            <a:endParaRPr lang="en-US"/>
-          </a:p>
-        </p:txBody>
-      </p:sp>
-      <p:sp>
-        <p:nvSpPr>
-          <p:cNvPr id="85" name="Oval 84"/>
-          <p:cNvSpPr/>
-          <p:nvPr/>
-        </p:nvSpPr>
-        <p:spPr>
-          <a:xfrm>
-            <a:off x="5489051" y="4957166"/>
-            <a:ext cx="659757" cy="405114"/>
-          </a:xfrm>
-          <a:prstGeom prst="ellipse">
-            <a:avLst/>
-          </a:prstGeom>
-        </p:spPr>
-        <p:style>
-          <a:lnRef idx="2">
-            <a:schemeClr val="accent1">
-              <a:shade val="50000"/>
-            </a:schemeClr>
-          </a:lnRef>
-          <a:fillRef idx="1">
-            <a:schemeClr val="accent1"/>
-          </a:fillRef>
-          <a:effectRef idx="0">
-            <a:schemeClr val="accent1"/>
-          </a:effectRef>
-          <a:fontRef idx="minor">
-            <a:schemeClr val="lt1"/>
-          </a:fontRef>
-        </p:style>
-        <p:txBody>
-          <a:bodyPr rtlCol="0" anchor="ctr"/>
-          <a:lstStyle/>
-          <a:p>
-            <a:pPr algn="ctr"/>
-            <a:endParaRPr lang="en-US"/>
-          </a:p>
-        </p:txBody>
-      </p:sp>
-      <p:sp>
-        <p:nvSpPr>
-          <p:cNvPr id="86" name="Oval 85"/>
-          <p:cNvSpPr/>
-          <p:nvPr/>
-        </p:nvSpPr>
-        <p:spPr>
-          <a:xfrm>
-            <a:off x="5489050" y="5672648"/>
-            <a:ext cx="659757" cy="405114"/>
-          </a:xfrm>
-          <a:prstGeom prst="ellipse">
-            <a:avLst/>
-          </a:prstGeom>
-        </p:spPr>
-        <p:style>
-          <a:lnRef idx="2">
-            <a:schemeClr val="accent1">
-              <a:shade val="50000"/>
-            </a:schemeClr>
-          </a:lnRef>
-          <a:fillRef idx="1">
-            <a:schemeClr val="accent1"/>
-          </a:fillRef>
-          <a:effectRef idx="0">
-            <a:schemeClr val="accent1"/>
-          </a:effectRef>
-          <a:fontRef idx="minor">
-            <a:schemeClr val="lt1"/>
-          </a:fontRef>
-        </p:style>
-        <p:txBody>
-          <a:bodyPr rtlCol="0" anchor="ctr"/>
-          <a:lstStyle/>
-          <a:p>
-            <a:pPr algn="ctr"/>
-            <a:endParaRPr lang="en-US"/>
-          </a:p>
-        </p:txBody>
-      </p:sp>
-      <p:cxnSp>
-        <p:nvCxnSpPr>
-          <p:cNvPr id="88" name="Straight Arrow Connector 87"/>
-          <p:cNvCxnSpPr>
-            <a:stCxn id="62" idx="4"/>
-            <a:endCxn id="84" idx="0"/>
-          </p:cNvCxnSpPr>
-          <p:nvPr/>
-        </p:nvCxnSpPr>
-        <p:spPr>
-          <a:xfrm>
-            <a:off x="5818931" y="3728759"/>
-            <a:ext cx="0" cy="512925"/>
-          </a:xfrm>
-          <a:prstGeom prst="straightConnector1">
-            <a:avLst/>
-          </a:prstGeom>
-          <a:ln>
-            <a:tailEnd type="triangle"/>
-          </a:ln>
-        </p:spPr>
-        <p:style>
-          <a:lnRef idx="1">
-            <a:schemeClr val="accent1"/>
-          </a:lnRef>
-          <a:fillRef idx="0">
-            <a:schemeClr val="accent1"/>
-          </a:fillRef>
-          <a:effectRef idx="0">
-            <a:schemeClr val="accent1"/>
-          </a:effectRef>
-          <a:fontRef idx="minor">
-            <a:schemeClr val="tx1"/>
-          </a:fontRef>
-        </p:style>
-      </p:cxnSp>
-      <p:cxnSp>
-        <p:nvCxnSpPr>
-          <p:cNvPr id="90" name="Straight Arrow Connector 89"/>
-          <p:cNvCxnSpPr>
-            <a:stCxn id="84" idx="4"/>
-            <a:endCxn id="85" idx="0"/>
-          </p:cNvCxnSpPr>
-          <p:nvPr/>
-        </p:nvCxnSpPr>
-        <p:spPr>
-          <a:xfrm flipH="1">
-            <a:off x="5818930" y="4646798"/>
-            <a:ext cx="1" cy="310368"/>
-          </a:xfrm>
-          <a:prstGeom prst="straightConnector1">
-            <a:avLst/>
-          </a:prstGeom>
-          <a:ln>
-            <a:tailEnd type="triangle"/>
-          </a:ln>
-        </p:spPr>
-        <p:style>
-          <a:lnRef idx="1">
-            <a:schemeClr val="accent1"/>
-          </a:lnRef>
-          <a:fillRef idx="0">
-            <a:schemeClr val="accent1"/>
-          </a:fillRef>
-          <a:effectRef idx="0">
-            <a:schemeClr val="accent1"/>
-          </a:effectRef>
-          <a:fontRef idx="minor">
-            <a:schemeClr val="tx1"/>
-          </a:fontRef>
-        </p:style>
-      </p:cxnSp>
-      <p:cxnSp>
-        <p:nvCxnSpPr>
-          <p:cNvPr id="92" name="Straight Arrow Connector 91"/>
-          <p:cNvCxnSpPr>
-            <a:stCxn id="85" idx="4"/>
-          </p:cNvCxnSpPr>
-          <p:nvPr/>
-        </p:nvCxnSpPr>
-        <p:spPr>
-          <a:xfrm flipH="1">
-            <a:off x="5818928" y="5362280"/>
-            <a:ext cx="2" cy="344295"/>
-          </a:xfrm>
-          <a:prstGeom prst="straightConnector1">
-            <a:avLst/>
-          </a:prstGeom>
-          <a:ln>
-            <a:tailEnd type="triangle"/>
-          </a:ln>
-        </p:spPr>
-        <p:style>
-          <a:lnRef idx="1">
-            <a:schemeClr val="accent1"/>
-          </a:lnRef>
-          <a:fillRef idx="0">
-            <a:schemeClr val="accent1"/>
-          </a:fillRef>
-          <a:effectRef idx="0">
-            <a:schemeClr val="accent1"/>
-          </a:effectRef>
-          <a:fontRef idx="minor">
-            <a:schemeClr val="tx1"/>
-          </a:fontRef>
-        </p:style>
-      </p:cxnSp>
+            <a:endParaRPr lang="en-US" sz="500">
+              <a:ln w="0"/>
+              <a:solidFill>
+                <a:schemeClr val="tx1"/>
+              </a:solidFill>
+              <a:effectLst>
+                <a:outerShdw blurRad="38100" dist="19050" dir="2700000" algn="tl" rotWithShape="0">
+                  <a:schemeClr val="dk1">
+                    <a:alpha val="40000"/>
+                  </a:schemeClr>
+                </a:outerShdw>
+              </a:effectLst>
+            </a:endParaRPr>
+          </a:p>
+        </p:txBody>
+      </p:sp>
       <p:sp>
         <p:nvSpPr>
           <p:cNvPr id="94" name="Oval 93"/>
@@ -4688,12 +4460,26 @@
         </p:nvSpPr>
         <p:spPr>
           <a:xfrm>
-            <a:off x="2424895" y="5584492"/>
+            <a:off x="1832734" y="4824762"/>
             <a:ext cx="659757" cy="405114"/>
           </a:xfrm>
           <a:prstGeom prst="ellipse">
             <a:avLst/>
           </a:prstGeom>
+          <a:solidFill>
+            <a:schemeClr val="accent1">
+              <a:lumMod val="20000"/>
+              <a:lumOff val="80000"/>
+            </a:schemeClr>
+          </a:solidFill>
+          <a:ln>
+            <a:solidFill>
+              <a:schemeClr val="accent1">
+                <a:lumMod val="60000"/>
+                <a:lumOff val="40000"/>
+              </a:schemeClr>
+            </a:solidFill>
+          </a:ln>
         </p:spPr>
         <p:style>
           <a:lnRef idx="2">
@@ -4715,8 +4501,19 @@
           <a:bodyPr rtlCol="0" anchor="ctr"/>
           <a:lstStyle/>
           <a:p>
-            <a:pPr algn="ctr"/>
-            <a:endParaRPr lang="en-US"/>
+            <a:endParaRPr lang="en-US" sz="500">
+              <a:ln w="0"/>
+              <a:solidFill>
+                <a:schemeClr val="tx1"/>
+              </a:solidFill>
+              <a:effectLst>
+                <a:outerShdw blurRad="38100" dist="19050" dir="2700000" algn="tl" rotWithShape="0">
+                  <a:schemeClr val="dk1">
+                    <a:alpha val="40000"/>
+                  </a:schemeClr>
+                </a:outerShdw>
+              </a:effectLst>
+            </a:endParaRPr>
           </a:p>
         </p:txBody>
       </p:sp>
@@ -4728,12 +4525,26 @@
         </p:nvSpPr>
         <p:spPr>
           <a:xfrm>
-            <a:off x="3215593" y="5606911"/>
+            <a:off x="2623432" y="4847181"/>
             <a:ext cx="659757" cy="405114"/>
           </a:xfrm>
           <a:prstGeom prst="ellipse">
             <a:avLst/>
           </a:prstGeom>
+          <a:solidFill>
+            <a:schemeClr val="accent1">
+              <a:lumMod val="20000"/>
+              <a:lumOff val="80000"/>
+            </a:schemeClr>
+          </a:solidFill>
+          <a:ln>
+            <a:solidFill>
+              <a:schemeClr val="accent1">
+                <a:lumMod val="60000"/>
+                <a:lumOff val="40000"/>
+              </a:schemeClr>
+            </a:solidFill>
+          </a:ln>
         </p:spPr>
         <p:style>
           <a:lnRef idx="2">
@@ -4755,8 +4566,19 @@
           <a:bodyPr rtlCol="0" anchor="ctr"/>
           <a:lstStyle/>
           <a:p>
-            <a:pPr algn="ctr"/>
-            <a:endParaRPr lang="en-US"/>
+            <a:endParaRPr lang="en-US" sz="500">
+              <a:ln w="0"/>
+              <a:solidFill>
+                <a:schemeClr val="tx1"/>
+              </a:solidFill>
+              <a:effectLst>
+                <a:outerShdw blurRad="38100" dist="19050" dir="2700000" algn="tl" rotWithShape="0">
+                  <a:schemeClr val="dk1">
+                    <a:alpha val="40000"/>
+                  </a:schemeClr>
+                </a:outerShdw>
+              </a:effectLst>
+            </a:endParaRPr>
           </a:p>
         </p:txBody>
       </p:sp>
@@ -4768,12 +4590,26 @@
         </p:nvSpPr>
         <p:spPr>
           <a:xfrm>
-            <a:off x="4064770" y="5584492"/>
+            <a:off x="3472609" y="4824762"/>
             <a:ext cx="659757" cy="405114"/>
           </a:xfrm>
           <a:prstGeom prst="ellipse">
             <a:avLst/>
           </a:prstGeom>
+          <a:solidFill>
+            <a:schemeClr val="accent1">
+              <a:lumMod val="20000"/>
+              <a:lumOff val="80000"/>
+            </a:schemeClr>
+          </a:solidFill>
+          <a:ln>
+            <a:solidFill>
+              <a:schemeClr val="accent1">
+                <a:lumMod val="60000"/>
+                <a:lumOff val="40000"/>
+              </a:schemeClr>
+            </a:solidFill>
+          </a:ln>
         </p:spPr>
         <p:style>
           <a:lnRef idx="2">
@@ -4795,8 +4631,19 @@
           <a:bodyPr rtlCol="0" anchor="ctr"/>
           <a:lstStyle/>
           <a:p>
-            <a:pPr algn="ctr"/>
-            <a:endParaRPr lang="en-US"/>
+            <a:endParaRPr lang="en-US" sz="500">
+              <a:ln w="0"/>
+              <a:solidFill>
+                <a:schemeClr val="tx1"/>
+              </a:solidFill>
+              <a:effectLst>
+                <a:outerShdw blurRad="38100" dist="19050" dir="2700000" algn="tl" rotWithShape="0">
+                  <a:schemeClr val="dk1">
+                    <a:alpha val="40000"/>
+                  </a:schemeClr>
+                </a:outerShdw>
+              </a:effectLst>
+            </a:endParaRPr>
           </a:p>
         </p:txBody>
       </p:sp>
@@ -4810,9 +4657,9 @@
           <p:nvPr/>
         </p:nvCxnSpPr>
         <p:spPr>
-          <a:xfrm flipH="1">
-            <a:off x="2754774" y="4853869"/>
-            <a:ext cx="252356" cy="730623"/>
+          <a:xfrm>
+            <a:off x="1681175" y="3680751"/>
+            <a:ext cx="481438" cy="1144011"/>
           </a:xfrm>
           <a:prstGeom prst="straightConnector1">
             <a:avLst/>
@@ -4847,8 +4694,8 @@
         </p:nvCxnSpPr>
         <p:spPr>
           <a:xfrm>
-            <a:off x="3240390" y="4913197"/>
-            <a:ext cx="305082" cy="693714"/>
+            <a:off x="1914435" y="3740079"/>
+            <a:ext cx="1038876" cy="1107102"/>
           </a:xfrm>
           <a:prstGeom prst="straightConnector1">
             <a:avLst/>
@@ -4883,8 +4730,8 @@
         </p:nvCxnSpPr>
         <p:spPr>
           <a:xfrm>
-            <a:off x="3473649" y="4853869"/>
-            <a:ext cx="921000" cy="730623"/>
+            <a:off x="2147694" y="3680751"/>
+            <a:ext cx="1654794" cy="1144011"/>
           </a:xfrm>
           <a:prstGeom prst="straightConnector1">
             <a:avLst/>
@@ -4908,86 +4755,6 @@
           </a:fontRef>
         </p:style>
       </p:cxnSp>
-      <p:sp>
-        <p:nvSpPr>
-          <p:cNvPr id="103" name="Oval 102"/>
-          <p:cNvSpPr/>
-          <p:nvPr/>
-        </p:nvSpPr>
-        <p:spPr>
-          <a:xfrm>
-            <a:off x="2410510" y="6322393"/>
-            <a:ext cx="659757" cy="405114"/>
-          </a:xfrm>
-          <a:prstGeom prst="ellipse">
-            <a:avLst/>
-          </a:prstGeom>
-        </p:spPr>
-        <p:style>
-          <a:lnRef idx="2">
-            <a:schemeClr val="accent1">
-              <a:shade val="50000"/>
-            </a:schemeClr>
-          </a:lnRef>
-          <a:fillRef idx="1">
-            <a:schemeClr val="accent1"/>
-          </a:fillRef>
-          <a:effectRef idx="0">
-            <a:schemeClr val="accent1"/>
-          </a:effectRef>
-          <a:fontRef idx="minor">
-            <a:schemeClr val="lt1"/>
-          </a:fontRef>
-        </p:style>
-        <p:txBody>
-          <a:bodyPr rtlCol="0" anchor="ctr"/>
-          <a:lstStyle/>
-          <a:p>
-            <a:pPr algn="ctr"/>
-            <a:endParaRPr lang="en-US"/>
-          </a:p>
-        </p:txBody>
-      </p:sp>
-      <p:sp>
-        <p:nvSpPr>
-          <p:cNvPr id="104" name="Oval 103"/>
-          <p:cNvSpPr/>
-          <p:nvPr/>
-        </p:nvSpPr>
-        <p:spPr>
-          <a:xfrm>
-            <a:off x="3676412" y="6410225"/>
-            <a:ext cx="659757" cy="405114"/>
-          </a:xfrm>
-          <a:prstGeom prst="ellipse">
-            <a:avLst/>
-          </a:prstGeom>
-        </p:spPr>
-        <p:style>
-          <a:lnRef idx="2">
-            <a:schemeClr val="accent1">
-              <a:shade val="50000"/>
-            </a:schemeClr>
-          </a:lnRef>
-          <a:fillRef idx="1">
-            <a:schemeClr val="accent1"/>
-          </a:fillRef>
-          <a:effectRef idx="0">
-            <a:schemeClr val="accent1"/>
-          </a:effectRef>
-          <a:fontRef idx="minor">
-            <a:schemeClr val="lt1"/>
-          </a:fontRef>
-        </p:style>
-        <p:txBody>
-          <a:bodyPr rtlCol="0" anchor="ctr"/>
-          <a:lstStyle/>
-          <a:p>
-            <a:pPr algn="ctr"/>
-            <a:endParaRPr lang="en-US"/>
-          </a:p>
-        </p:txBody>
-      </p:sp>
       <p:sp>
         <p:nvSpPr>
           <p:cNvPr id="105" name="Oval 104"/>
@@ -4996,12 +4763,26 @@
         </p:nvSpPr>
         <p:spPr>
           <a:xfrm>
-            <a:off x="4620590" y="6415391"/>
+            <a:off x="4028429" y="5655661"/>
             <a:ext cx="659757" cy="405114"/>
           </a:xfrm>
           <a:prstGeom prst="ellipse">
             <a:avLst/>
           </a:prstGeom>
+          <a:solidFill>
+            <a:schemeClr val="accent1">
+              <a:lumMod val="20000"/>
+              <a:lumOff val="80000"/>
+            </a:schemeClr>
+          </a:solidFill>
+          <a:ln>
+            <a:solidFill>
+              <a:schemeClr val="accent1">
+                <a:lumMod val="60000"/>
+                <a:lumOff val="40000"/>
+              </a:schemeClr>
+            </a:solidFill>
+          </a:ln>
         </p:spPr>
         <p:style>
           <a:lnRef idx="2">
@@ -5023,100 +4804,35 @@
           <a:bodyPr rtlCol="0" anchor="ctr"/>
           <a:lstStyle/>
           <a:p>
-            <a:pPr algn="ctr"/>
-            <a:endParaRPr lang="en-US"/>
-          </a:p>
-        </p:txBody>
-      </p:sp>
-      <p:sp>
-        <p:nvSpPr>
-          <p:cNvPr id="106" name="Oval 105"/>
-          <p:cNvSpPr/>
-          <p:nvPr/>
-        </p:nvSpPr>
-        <p:spPr>
-          <a:xfrm>
-            <a:off x="4635661" y="7142193"/>
-            <a:ext cx="659757" cy="405114"/>
-          </a:xfrm>
-          <a:prstGeom prst="ellipse">
-            <a:avLst/>
-          </a:prstGeom>
-        </p:spPr>
-        <p:style>
-          <a:lnRef idx="2">
-            <a:schemeClr val="accent1">
-              <a:shade val="50000"/>
-            </a:schemeClr>
-          </a:lnRef>
-          <a:fillRef idx="1">
-            <a:schemeClr val="accent1"/>
-          </a:fillRef>
-          <a:effectRef idx="0">
-            <a:schemeClr val="accent1"/>
-          </a:effectRef>
-          <a:fontRef idx="minor">
-            <a:schemeClr val="lt1"/>
-          </a:fontRef>
-        </p:style>
-        <p:txBody>
-          <a:bodyPr rtlCol="0" anchor="ctr"/>
-          <a:lstStyle/>
-          <a:p>
-            <a:pPr algn="ctr"/>
-            <a:endParaRPr lang="en-US"/>
-          </a:p>
-        </p:txBody>
-      </p:sp>
-      <p:cxnSp>
-        <p:nvCxnSpPr>
-          <p:cNvPr id="108" name="Straight Arrow Connector 107"/>
-          <p:cNvCxnSpPr>
-            <a:stCxn id="94" idx="4"/>
-            <a:endCxn id="103" idx="0"/>
-          </p:cNvCxnSpPr>
-          <p:nvPr/>
-        </p:nvCxnSpPr>
-        <p:spPr>
-          <a:xfrm flipH="1">
-            <a:off x="2740389" y="5989606"/>
-            <a:ext cx="14385" cy="332787"/>
-          </a:xfrm>
-          <a:prstGeom prst="straightConnector1">
-            <a:avLst/>
-          </a:prstGeom>
-          <a:ln>
-            <a:tailEnd type="triangle"/>
-          </a:ln>
-        </p:spPr>
-        <p:style>
-          <a:lnRef idx="1">
-            <a:schemeClr val="accent1"/>
-          </a:lnRef>
-          <a:fillRef idx="0">
-            <a:schemeClr val="accent1"/>
-          </a:fillRef>
-          <a:effectRef idx="0">
-            <a:schemeClr val="accent1"/>
-          </a:effectRef>
-          <a:fontRef idx="minor">
-            <a:schemeClr val="tx1"/>
-          </a:fontRef>
-        </p:style>
-      </p:cxnSp>
+            <a:endParaRPr lang="en-US" sz="500">
+              <a:ln w="0"/>
+              <a:solidFill>
+                <a:schemeClr val="tx1"/>
+              </a:solidFill>
+              <a:effectLst>
+                <a:outerShdw blurRad="38100" dist="19050" dir="2700000" algn="tl" rotWithShape="0">
+                  <a:schemeClr val="dk1">
+                    <a:alpha val="40000"/>
+                  </a:schemeClr>
+                </a:outerShdw>
+              </a:effectLst>
+            </a:endParaRPr>
+          </a:p>
+        </p:txBody>
+      </p:sp>
       <p:cxnSp>
         <p:nvCxnSpPr>
           <p:cNvPr id="110" name="Straight Arrow Connector 109"/>
           <p:cNvCxnSpPr>
             <a:stCxn id="96" idx="3"/>
-            <a:endCxn id="104" idx="0"/>
+            <a:endCxn id="118" idx="0"/>
           </p:cNvCxnSpPr>
           <p:nvPr/>
         </p:nvCxnSpPr>
         <p:spPr>
           <a:xfrm flipH="1">
-            <a:off x="4006291" y="5930278"/>
-            <a:ext cx="155098" cy="479947"/>
+            <a:off x="3380175" y="5170548"/>
+            <a:ext cx="189053" cy="500401"/>
           </a:xfrm>
           <a:prstGeom prst="straightConnector1">
             <a:avLst/>
@@ -5151,8 +4867,334 @@
         </p:nvCxnSpPr>
         <p:spPr>
           <a:xfrm>
-            <a:off x="4627908" y="5930278"/>
+            <a:off x="4035747" y="5170548"/>
             <a:ext cx="322561" cy="485113"/>
+          </a:xfrm>
+          <a:prstGeom prst="straightConnector1">
+            <a:avLst/>
+          </a:prstGeom>
+          <a:ln>
+            <a:tailEnd type="triangle"/>
+          </a:ln>
+        </p:spPr>
+        <p:style>
+          <a:lnRef idx="1">
+            <a:schemeClr val="accent1"/>
+          </a:lnRef>
+          <a:fillRef idx="0">
+            <a:schemeClr val="accent1"/>
+          </a:fillRef>
+          <a:effectRef idx="0">
+            <a:schemeClr val="accent1"/>
+          </a:effectRef>
+          <a:fontRef idx="minor">
+            <a:schemeClr val="tx1"/>
+          </a:fontRef>
+        </p:style>
+      </p:cxnSp>
+      <p:sp>
+        <p:nvSpPr>
+          <p:cNvPr id="2" name="TextBox 1"/>
+          <p:cNvSpPr txBox="1"/>
+          <p:nvPr/>
+        </p:nvSpPr>
+        <p:spPr>
+          <a:xfrm>
+            <a:off x="243068" y="92597"/>
+            <a:ext cx="2476984" cy="276999"/>
+          </a:xfrm>
+          <a:prstGeom prst="rect">
+            <a:avLst/>
+          </a:prstGeom>
+          <a:noFill/>
+        </p:spPr>
+        <p:txBody>
+          <a:bodyPr wrap="square" rtlCol="0">
+            <a:spAutoFit/>
+          </a:bodyPr>
+          <a:lstStyle/>
+          <a:p>
+            <a:r>
+              <a:rPr lang="en-US" sz="1200" dirty="0" smtClean="0"/>
+              <a:t>ZOO Decision Tree</a:t>
+            </a:r>
+            <a:endParaRPr lang="en-US" sz="1200" dirty="0"/>
+          </a:p>
+        </p:txBody>
+      </p:sp>
+      <p:sp>
+        <p:nvSpPr>
+          <p:cNvPr id="91" name="Oval 90"/>
+          <p:cNvSpPr/>
+          <p:nvPr/>
+        </p:nvSpPr>
+        <p:spPr>
+          <a:xfrm>
+            <a:off x="5530666" y="3424194"/>
+            <a:ext cx="659757" cy="405114"/>
+          </a:xfrm>
+          <a:prstGeom prst="ellipse">
+            <a:avLst/>
+          </a:prstGeom>
+          <a:solidFill>
+            <a:schemeClr val="accent1">
+              <a:lumMod val="20000"/>
+              <a:lumOff val="80000"/>
+            </a:schemeClr>
+          </a:solidFill>
+          <a:ln>
+            <a:solidFill>
+              <a:schemeClr val="accent1">
+                <a:lumMod val="60000"/>
+                <a:lumOff val="40000"/>
+              </a:schemeClr>
+            </a:solidFill>
+          </a:ln>
+        </p:spPr>
+        <p:style>
+          <a:lnRef idx="2">
+            <a:schemeClr val="accent1">
+              <a:shade val="50000"/>
+            </a:schemeClr>
+          </a:lnRef>
+          <a:fillRef idx="1">
+            <a:schemeClr val="accent1"/>
+          </a:fillRef>
+          <a:effectRef idx="0">
+            <a:schemeClr val="accent1"/>
+          </a:effectRef>
+          <a:fontRef idx="minor">
+            <a:schemeClr val="lt1"/>
+          </a:fontRef>
+        </p:style>
+        <p:txBody>
+          <a:bodyPr rtlCol="0" anchor="ctr"/>
+          <a:lstStyle/>
+          <a:p>
+            <a:endParaRPr lang="en-US" sz="500">
+              <a:ln w="0"/>
+              <a:solidFill>
+                <a:schemeClr val="tx1"/>
+              </a:solidFill>
+              <a:effectLst>
+                <a:outerShdw blurRad="38100" dist="19050" dir="2700000" algn="tl" rotWithShape="0">
+                  <a:schemeClr val="dk1">
+                    <a:alpha val="40000"/>
+                  </a:schemeClr>
+                </a:outerShdw>
+              </a:effectLst>
+            </a:endParaRPr>
+          </a:p>
+        </p:txBody>
+      </p:sp>
+      <p:sp>
+        <p:nvSpPr>
+          <p:cNvPr id="93" name="Oval 92"/>
+          <p:cNvSpPr/>
+          <p:nvPr/>
+        </p:nvSpPr>
+        <p:spPr>
+          <a:xfrm>
+            <a:off x="4397003" y="4856840"/>
+            <a:ext cx="659757" cy="405114"/>
+          </a:xfrm>
+          <a:prstGeom prst="ellipse">
+            <a:avLst/>
+          </a:prstGeom>
+          <a:solidFill>
+            <a:schemeClr val="accent1">
+              <a:lumMod val="20000"/>
+              <a:lumOff val="80000"/>
+            </a:schemeClr>
+          </a:solidFill>
+          <a:ln>
+            <a:solidFill>
+              <a:schemeClr val="accent1">
+                <a:lumMod val="60000"/>
+                <a:lumOff val="40000"/>
+              </a:schemeClr>
+            </a:solidFill>
+          </a:ln>
+        </p:spPr>
+        <p:style>
+          <a:lnRef idx="2">
+            <a:schemeClr val="accent1">
+              <a:shade val="50000"/>
+            </a:schemeClr>
+          </a:lnRef>
+          <a:fillRef idx="1">
+            <a:schemeClr val="accent1"/>
+          </a:fillRef>
+          <a:effectRef idx="0">
+            <a:schemeClr val="accent1"/>
+          </a:effectRef>
+          <a:fontRef idx="minor">
+            <a:schemeClr val="lt1"/>
+          </a:fontRef>
+        </p:style>
+        <p:txBody>
+          <a:bodyPr rtlCol="0" anchor="ctr"/>
+          <a:lstStyle/>
+          <a:p>
+            <a:endParaRPr lang="en-US" sz="500">
+              <a:ln w="0"/>
+              <a:solidFill>
+                <a:schemeClr val="tx1"/>
+              </a:solidFill>
+              <a:effectLst>
+                <a:outerShdw blurRad="38100" dist="19050" dir="2700000" algn="tl" rotWithShape="0">
+                  <a:schemeClr val="dk1">
+                    <a:alpha val="40000"/>
+                  </a:schemeClr>
+                </a:outerShdw>
+              </a:effectLst>
+            </a:endParaRPr>
+          </a:p>
+        </p:txBody>
+      </p:sp>
+      <p:sp>
+        <p:nvSpPr>
+          <p:cNvPr id="97" name="Oval 96"/>
+          <p:cNvSpPr/>
+          <p:nvPr/>
+        </p:nvSpPr>
+        <p:spPr>
+          <a:xfrm>
+            <a:off x="5187701" y="4879259"/>
+            <a:ext cx="659757" cy="405114"/>
+          </a:xfrm>
+          <a:prstGeom prst="ellipse">
+            <a:avLst/>
+          </a:prstGeom>
+          <a:solidFill>
+            <a:schemeClr val="accent1">
+              <a:lumMod val="20000"/>
+              <a:lumOff val="80000"/>
+            </a:schemeClr>
+          </a:solidFill>
+          <a:ln>
+            <a:solidFill>
+              <a:schemeClr val="accent1">
+                <a:lumMod val="60000"/>
+                <a:lumOff val="40000"/>
+              </a:schemeClr>
+            </a:solidFill>
+          </a:ln>
+        </p:spPr>
+        <p:style>
+          <a:lnRef idx="2">
+            <a:schemeClr val="accent1">
+              <a:shade val="50000"/>
+            </a:schemeClr>
+          </a:lnRef>
+          <a:fillRef idx="1">
+            <a:schemeClr val="accent1"/>
+          </a:fillRef>
+          <a:effectRef idx="0">
+            <a:schemeClr val="accent1"/>
+          </a:effectRef>
+          <a:fontRef idx="minor">
+            <a:schemeClr val="lt1"/>
+          </a:fontRef>
+        </p:style>
+        <p:txBody>
+          <a:bodyPr rtlCol="0" anchor="ctr"/>
+          <a:lstStyle/>
+          <a:p>
+            <a:endParaRPr lang="en-US" sz="500">
+              <a:ln w="0"/>
+              <a:solidFill>
+                <a:schemeClr val="tx1"/>
+              </a:solidFill>
+              <a:effectLst>
+                <a:outerShdw blurRad="38100" dist="19050" dir="2700000" algn="tl" rotWithShape="0">
+                  <a:schemeClr val="dk1">
+                    <a:alpha val="40000"/>
+                  </a:schemeClr>
+                </a:outerShdw>
+              </a:effectLst>
+            </a:endParaRPr>
+          </a:p>
+        </p:txBody>
+      </p:sp>
+      <p:sp>
+        <p:nvSpPr>
+          <p:cNvPr id="99" name="Oval 98"/>
+          <p:cNvSpPr/>
+          <p:nvPr/>
+        </p:nvSpPr>
+        <p:spPr>
+          <a:xfrm>
+            <a:off x="6036878" y="4856840"/>
+            <a:ext cx="659757" cy="405114"/>
+          </a:xfrm>
+          <a:prstGeom prst="ellipse">
+            <a:avLst/>
+          </a:prstGeom>
+          <a:solidFill>
+            <a:schemeClr val="accent1">
+              <a:lumMod val="20000"/>
+              <a:lumOff val="80000"/>
+            </a:schemeClr>
+          </a:solidFill>
+          <a:ln>
+            <a:solidFill>
+              <a:schemeClr val="accent1">
+                <a:lumMod val="60000"/>
+                <a:lumOff val="40000"/>
+              </a:schemeClr>
+            </a:solidFill>
+          </a:ln>
+        </p:spPr>
+        <p:style>
+          <a:lnRef idx="2">
+            <a:schemeClr val="accent1">
+              <a:shade val="50000"/>
+            </a:schemeClr>
+          </a:lnRef>
+          <a:fillRef idx="1">
+            <a:schemeClr val="accent1"/>
+          </a:fillRef>
+          <a:effectRef idx="0">
+            <a:schemeClr val="accent1"/>
+          </a:effectRef>
+          <a:fontRef idx="minor">
+            <a:schemeClr val="lt1"/>
+          </a:fontRef>
+        </p:style>
+        <p:txBody>
+          <a:bodyPr rtlCol="0" anchor="ctr"/>
+          <a:lstStyle/>
+          <a:p>
+            <a:endParaRPr lang="en-US" sz="500">
+              <a:ln w="0"/>
+              <a:solidFill>
+                <a:schemeClr val="tx1"/>
+              </a:solidFill>
+              <a:effectLst>
+                <a:outerShdw blurRad="38100" dist="19050" dir="2700000" algn="tl" rotWithShape="0">
+                  <a:schemeClr val="dk1">
+                    <a:alpha val="40000"/>
+                  </a:schemeClr>
+                </a:outerShdw>
+              </a:effectLst>
+            </a:endParaRPr>
+          </a:p>
+        </p:txBody>
+      </p:sp>
+      <p:cxnSp>
+        <p:nvCxnSpPr>
+          <p:cNvPr id="101" name="Straight Arrow Connector 100"/>
+          <p:cNvCxnSpPr>
+            <a:stCxn id="91" idx="3"/>
+            <a:endCxn id="93" idx="0"/>
+          </p:cNvCxnSpPr>
+          <p:nvPr/>
+        </p:nvCxnSpPr>
+        <p:spPr>
+          <a:xfrm flipH="1">
+            <a:off x="4726882" y="3769980"/>
+            <a:ext cx="900403" cy="1086860"/>
           </a:xfrm>
           <a:prstGeom prst="straightConnector1">
             <a:avLst/>
@@ -5178,16 +5220,17 @@
       </p:cxnSp>
       <p:cxnSp>
         <p:nvCxnSpPr>
-          <p:cNvPr id="114" name="Straight Arrow Connector 113"/>
+          <p:cNvPr id="107" name="Straight Arrow Connector 106"/>
           <p:cNvCxnSpPr>
-            <a:stCxn id="105" idx="4"/>
+            <a:stCxn id="91" idx="4"/>
+            <a:endCxn id="97" idx="0"/>
           </p:cNvCxnSpPr>
           <p:nvPr/>
         </p:nvCxnSpPr>
         <p:spPr>
-          <a:xfrm>
-            <a:off x="4950469" y="6820505"/>
-            <a:ext cx="15071" cy="321688"/>
+          <a:xfrm flipH="1">
+            <a:off x="5517580" y="3829308"/>
+            <a:ext cx="342965" cy="1049951"/>
           </a:xfrm>
           <a:prstGeom prst="straightConnector1">
             <a:avLst/>
@@ -5211,6 +5254,686 @@
           </a:fontRef>
         </p:style>
       </p:cxnSp>
+      <p:cxnSp>
+        <p:nvCxnSpPr>
+          <p:cNvPr id="109" name="Straight Arrow Connector 108"/>
+          <p:cNvCxnSpPr>
+            <a:stCxn id="91" idx="5"/>
+            <a:endCxn id="99" idx="0"/>
+          </p:cNvCxnSpPr>
+          <p:nvPr/>
+        </p:nvCxnSpPr>
+        <p:spPr>
+          <a:xfrm>
+            <a:off x="6093804" y="3769980"/>
+            <a:ext cx="272953" cy="1086860"/>
+          </a:xfrm>
+          <a:prstGeom prst="straightConnector1">
+            <a:avLst/>
+          </a:prstGeom>
+          <a:ln>
+            <a:tailEnd type="triangle"/>
+          </a:ln>
+        </p:spPr>
+        <p:style>
+          <a:lnRef idx="1">
+            <a:schemeClr val="accent1"/>
+          </a:lnRef>
+          <a:fillRef idx="0">
+            <a:schemeClr val="accent1"/>
+          </a:fillRef>
+          <a:effectRef idx="0">
+            <a:schemeClr val="accent1"/>
+          </a:effectRef>
+          <a:fontRef idx="minor">
+            <a:schemeClr val="tx1"/>
+          </a:fontRef>
+        </p:style>
+      </p:cxnSp>
+      <p:sp>
+        <p:nvSpPr>
+          <p:cNvPr id="111" name="Oval 110"/>
+          <p:cNvSpPr/>
+          <p:nvPr/>
+        </p:nvSpPr>
+        <p:spPr>
+          <a:xfrm>
+            <a:off x="5106366" y="5728048"/>
+            <a:ext cx="659757" cy="405114"/>
+          </a:xfrm>
+          <a:prstGeom prst="ellipse">
+            <a:avLst/>
+          </a:prstGeom>
+          <a:solidFill>
+            <a:schemeClr val="accent1">
+              <a:lumMod val="20000"/>
+              <a:lumOff val="80000"/>
+            </a:schemeClr>
+          </a:solidFill>
+          <a:ln>
+            <a:solidFill>
+              <a:schemeClr val="accent1">
+                <a:lumMod val="60000"/>
+                <a:lumOff val="40000"/>
+              </a:schemeClr>
+            </a:solidFill>
+          </a:ln>
+        </p:spPr>
+        <p:style>
+          <a:lnRef idx="2">
+            <a:schemeClr val="accent1">
+              <a:shade val="50000"/>
+            </a:schemeClr>
+          </a:lnRef>
+          <a:fillRef idx="1">
+            <a:schemeClr val="accent1"/>
+          </a:fillRef>
+          <a:effectRef idx="0">
+            <a:schemeClr val="accent1"/>
+          </a:effectRef>
+          <a:fontRef idx="minor">
+            <a:schemeClr val="lt1"/>
+          </a:fontRef>
+        </p:style>
+        <p:txBody>
+          <a:bodyPr rtlCol="0" anchor="ctr"/>
+          <a:lstStyle/>
+          <a:p>
+            <a:endParaRPr lang="en-US" sz="500">
+              <a:ln w="0"/>
+              <a:solidFill>
+                <a:schemeClr val="tx1"/>
+              </a:solidFill>
+              <a:effectLst>
+                <a:outerShdw blurRad="38100" dist="19050" dir="2700000" algn="tl" rotWithShape="0">
+                  <a:schemeClr val="dk1">
+                    <a:alpha val="40000"/>
+                  </a:schemeClr>
+                </a:outerShdw>
+              </a:effectLst>
+            </a:endParaRPr>
+          </a:p>
+        </p:txBody>
+      </p:sp>
+      <p:sp>
+        <p:nvSpPr>
+          <p:cNvPr id="113" name="Oval 112"/>
+          <p:cNvSpPr/>
+          <p:nvPr/>
+        </p:nvSpPr>
+        <p:spPr>
+          <a:xfrm>
+            <a:off x="6050544" y="5733214"/>
+            <a:ext cx="659757" cy="405114"/>
+          </a:xfrm>
+          <a:prstGeom prst="ellipse">
+            <a:avLst/>
+          </a:prstGeom>
+          <a:solidFill>
+            <a:schemeClr val="accent1">
+              <a:lumMod val="20000"/>
+              <a:lumOff val="80000"/>
+            </a:schemeClr>
+          </a:solidFill>
+          <a:ln>
+            <a:solidFill>
+              <a:schemeClr val="accent1">
+                <a:lumMod val="60000"/>
+                <a:lumOff val="40000"/>
+              </a:schemeClr>
+            </a:solidFill>
+          </a:ln>
+        </p:spPr>
+        <p:style>
+          <a:lnRef idx="2">
+            <a:schemeClr val="accent1">
+              <a:shade val="50000"/>
+            </a:schemeClr>
+          </a:lnRef>
+          <a:fillRef idx="1">
+            <a:schemeClr val="accent1"/>
+          </a:fillRef>
+          <a:effectRef idx="0">
+            <a:schemeClr val="accent1"/>
+          </a:effectRef>
+          <a:fontRef idx="minor">
+            <a:schemeClr val="lt1"/>
+          </a:fontRef>
+        </p:style>
+        <p:txBody>
+          <a:bodyPr rtlCol="0" anchor="ctr"/>
+          <a:lstStyle/>
+          <a:p>
+            <a:endParaRPr lang="en-US" sz="500">
+              <a:ln w="0"/>
+              <a:solidFill>
+                <a:schemeClr val="tx1"/>
+              </a:solidFill>
+              <a:effectLst>
+                <a:outerShdw blurRad="38100" dist="19050" dir="2700000" algn="tl" rotWithShape="0">
+                  <a:schemeClr val="dk1">
+                    <a:alpha val="40000"/>
+                  </a:schemeClr>
+                </a:outerShdw>
+              </a:effectLst>
+            </a:endParaRPr>
+          </a:p>
+        </p:txBody>
+      </p:sp>
+      <p:cxnSp>
+        <p:nvCxnSpPr>
+          <p:cNvPr id="115" name="Straight Arrow Connector 114"/>
+          <p:cNvCxnSpPr>
+            <a:stCxn id="99" idx="3"/>
+            <a:endCxn id="111" idx="0"/>
+          </p:cNvCxnSpPr>
+          <p:nvPr/>
+        </p:nvCxnSpPr>
+        <p:spPr>
+          <a:xfrm flipH="1">
+            <a:off x="5436245" y="5202626"/>
+            <a:ext cx="697252" cy="525422"/>
+          </a:xfrm>
+          <a:prstGeom prst="straightConnector1">
+            <a:avLst/>
+          </a:prstGeom>
+          <a:ln>
+            <a:tailEnd type="triangle"/>
+          </a:ln>
+        </p:spPr>
+        <p:style>
+          <a:lnRef idx="1">
+            <a:schemeClr val="accent1"/>
+          </a:lnRef>
+          <a:fillRef idx="0">
+            <a:schemeClr val="accent1"/>
+          </a:fillRef>
+          <a:effectRef idx="0">
+            <a:schemeClr val="accent1"/>
+          </a:effectRef>
+          <a:fontRef idx="minor">
+            <a:schemeClr val="tx1"/>
+          </a:fontRef>
+        </p:style>
+      </p:cxnSp>
+      <p:cxnSp>
+        <p:nvCxnSpPr>
+          <p:cNvPr id="116" name="Straight Arrow Connector 115"/>
+          <p:cNvCxnSpPr>
+            <a:stCxn id="99" idx="5"/>
+            <a:endCxn id="113" idx="0"/>
+          </p:cNvCxnSpPr>
+          <p:nvPr/>
+        </p:nvCxnSpPr>
+        <p:spPr>
+          <a:xfrm flipH="1">
+            <a:off x="6380423" y="5202626"/>
+            <a:ext cx="219593" cy="530588"/>
+          </a:xfrm>
+          <a:prstGeom prst="straightConnector1">
+            <a:avLst/>
+          </a:prstGeom>
+          <a:ln>
+            <a:tailEnd type="triangle"/>
+          </a:ln>
+        </p:spPr>
+        <p:style>
+          <a:lnRef idx="1">
+            <a:schemeClr val="accent1"/>
+          </a:lnRef>
+          <a:fillRef idx="0">
+            <a:schemeClr val="accent1"/>
+          </a:fillRef>
+          <a:effectRef idx="0">
+            <a:schemeClr val="accent1"/>
+          </a:effectRef>
+          <a:fontRef idx="minor">
+            <a:schemeClr val="tx1"/>
+          </a:fontRef>
+        </p:style>
+      </p:cxnSp>
+      <p:sp>
+        <p:nvSpPr>
+          <p:cNvPr id="118" name="Oval 117"/>
+          <p:cNvSpPr/>
+          <p:nvPr/>
+        </p:nvSpPr>
+        <p:spPr>
+          <a:xfrm>
+            <a:off x="3050296" y="5670949"/>
+            <a:ext cx="659757" cy="405114"/>
+          </a:xfrm>
+          <a:prstGeom prst="ellipse">
+            <a:avLst/>
+          </a:prstGeom>
+          <a:solidFill>
+            <a:schemeClr val="accent1">
+              <a:lumMod val="20000"/>
+              <a:lumOff val="80000"/>
+            </a:schemeClr>
+          </a:solidFill>
+          <a:ln>
+            <a:solidFill>
+              <a:schemeClr val="accent1">
+                <a:lumMod val="60000"/>
+                <a:lumOff val="40000"/>
+              </a:schemeClr>
+            </a:solidFill>
+          </a:ln>
+        </p:spPr>
+        <p:style>
+          <a:lnRef idx="2">
+            <a:schemeClr val="accent1">
+              <a:shade val="50000"/>
+            </a:schemeClr>
+          </a:lnRef>
+          <a:fillRef idx="1">
+            <a:schemeClr val="accent1"/>
+          </a:fillRef>
+          <a:effectRef idx="0">
+            <a:schemeClr val="accent1"/>
+          </a:effectRef>
+          <a:fontRef idx="minor">
+            <a:schemeClr val="lt1"/>
+          </a:fontRef>
+        </p:style>
+        <p:txBody>
+          <a:bodyPr rtlCol="0" anchor="ctr"/>
+          <a:lstStyle/>
+          <a:p>
+            <a:endParaRPr lang="en-US" sz="500">
+              <a:ln w="0"/>
+              <a:solidFill>
+                <a:schemeClr val="tx1"/>
+              </a:solidFill>
+              <a:effectLst>
+                <a:outerShdw blurRad="38100" dist="19050" dir="2700000" algn="tl" rotWithShape="0">
+                  <a:schemeClr val="dk1">
+                    <a:alpha val="40000"/>
+                  </a:schemeClr>
+                </a:outerShdw>
+              </a:effectLst>
+            </a:endParaRPr>
+          </a:p>
+        </p:txBody>
+      </p:sp>
+      <p:sp>
+        <p:nvSpPr>
+          <p:cNvPr id="119" name="Oval 118"/>
+          <p:cNvSpPr/>
+          <p:nvPr/>
+        </p:nvSpPr>
+        <p:spPr>
+          <a:xfrm>
+            <a:off x="2383272" y="6453914"/>
+            <a:ext cx="659757" cy="405114"/>
+          </a:xfrm>
+          <a:prstGeom prst="ellipse">
+            <a:avLst/>
+          </a:prstGeom>
+          <a:solidFill>
+            <a:schemeClr val="accent1">
+              <a:lumMod val="20000"/>
+              <a:lumOff val="80000"/>
+            </a:schemeClr>
+          </a:solidFill>
+          <a:ln>
+            <a:solidFill>
+              <a:schemeClr val="accent1">
+                <a:lumMod val="60000"/>
+                <a:lumOff val="40000"/>
+              </a:schemeClr>
+            </a:solidFill>
+          </a:ln>
+        </p:spPr>
+        <p:style>
+          <a:lnRef idx="2">
+            <a:schemeClr val="accent1">
+              <a:shade val="50000"/>
+            </a:schemeClr>
+          </a:lnRef>
+          <a:fillRef idx="1">
+            <a:schemeClr val="accent1"/>
+          </a:fillRef>
+          <a:effectRef idx="0">
+            <a:schemeClr val="accent1"/>
+          </a:effectRef>
+          <a:fontRef idx="minor">
+            <a:schemeClr val="lt1"/>
+          </a:fontRef>
+        </p:style>
+        <p:txBody>
+          <a:bodyPr rtlCol="0" anchor="ctr"/>
+          <a:lstStyle/>
+          <a:p>
+            <a:endParaRPr lang="en-US" sz="500">
+              <a:ln w="0"/>
+              <a:solidFill>
+                <a:schemeClr val="tx1"/>
+              </a:solidFill>
+              <a:effectLst>
+                <a:outerShdw blurRad="38100" dist="19050" dir="2700000" algn="tl" rotWithShape="0">
+                  <a:schemeClr val="dk1">
+                    <a:alpha val="40000"/>
+                  </a:schemeClr>
+                </a:outerShdw>
+              </a:effectLst>
+            </a:endParaRPr>
+          </a:p>
+        </p:txBody>
+      </p:sp>
+      <p:sp>
+        <p:nvSpPr>
+          <p:cNvPr id="120" name="Oval 119"/>
+          <p:cNvSpPr/>
+          <p:nvPr/>
+        </p:nvSpPr>
+        <p:spPr>
+          <a:xfrm>
+            <a:off x="3385306" y="6482082"/>
+            <a:ext cx="659757" cy="405114"/>
+          </a:xfrm>
+          <a:prstGeom prst="ellipse">
+            <a:avLst/>
+          </a:prstGeom>
+          <a:solidFill>
+            <a:schemeClr val="accent1">
+              <a:lumMod val="20000"/>
+              <a:lumOff val="80000"/>
+            </a:schemeClr>
+          </a:solidFill>
+          <a:ln>
+            <a:solidFill>
+              <a:schemeClr val="accent1">
+                <a:lumMod val="60000"/>
+                <a:lumOff val="40000"/>
+              </a:schemeClr>
+            </a:solidFill>
+          </a:ln>
+        </p:spPr>
+        <p:style>
+          <a:lnRef idx="2">
+            <a:schemeClr val="accent1">
+              <a:shade val="50000"/>
+            </a:schemeClr>
+          </a:lnRef>
+          <a:fillRef idx="1">
+            <a:schemeClr val="accent1"/>
+          </a:fillRef>
+          <a:effectRef idx="0">
+            <a:schemeClr val="accent1"/>
+          </a:effectRef>
+          <a:fontRef idx="minor">
+            <a:schemeClr val="lt1"/>
+          </a:fontRef>
+        </p:style>
+        <p:txBody>
+          <a:bodyPr rtlCol="0" anchor="ctr"/>
+          <a:lstStyle/>
+          <a:p>
+            <a:endParaRPr lang="en-US" sz="500">
+              <a:ln w="0"/>
+              <a:solidFill>
+                <a:schemeClr val="tx1"/>
+              </a:solidFill>
+              <a:effectLst>
+                <a:outerShdw blurRad="38100" dist="19050" dir="2700000" algn="tl" rotWithShape="0">
+                  <a:schemeClr val="dk1">
+                    <a:alpha val="40000"/>
+                  </a:schemeClr>
+                </a:outerShdw>
+              </a:effectLst>
+            </a:endParaRPr>
+          </a:p>
+        </p:txBody>
+      </p:sp>
+      <p:cxnSp>
+        <p:nvCxnSpPr>
+          <p:cNvPr id="121" name="Straight Arrow Connector 120"/>
+          <p:cNvCxnSpPr>
+            <a:stCxn id="118" idx="3"/>
+            <a:endCxn id="119" idx="0"/>
+          </p:cNvCxnSpPr>
+          <p:nvPr/>
+        </p:nvCxnSpPr>
+        <p:spPr>
+          <a:xfrm flipH="1">
+            <a:off x="2713151" y="6016735"/>
+            <a:ext cx="433764" cy="437179"/>
+          </a:xfrm>
+          <a:prstGeom prst="straightConnector1">
+            <a:avLst/>
+          </a:prstGeom>
+          <a:ln>
+            <a:tailEnd type="triangle"/>
+          </a:ln>
+        </p:spPr>
+        <p:style>
+          <a:lnRef idx="1">
+            <a:schemeClr val="accent1"/>
+          </a:lnRef>
+          <a:fillRef idx="0">
+            <a:schemeClr val="accent1"/>
+          </a:fillRef>
+          <a:effectRef idx="0">
+            <a:schemeClr val="accent1"/>
+          </a:effectRef>
+          <a:fontRef idx="minor">
+            <a:schemeClr val="tx1"/>
+          </a:fontRef>
+        </p:style>
+      </p:cxnSp>
+      <p:cxnSp>
+        <p:nvCxnSpPr>
+          <p:cNvPr id="122" name="Straight Arrow Connector 121"/>
+          <p:cNvCxnSpPr>
+            <a:stCxn id="118" idx="5"/>
+            <a:endCxn id="120" idx="0"/>
+          </p:cNvCxnSpPr>
+          <p:nvPr/>
+        </p:nvCxnSpPr>
+        <p:spPr>
+          <a:xfrm>
+            <a:off x="3613434" y="6016735"/>
+            <a:ext cx="101751" cy="465347"/>
+          </a:xfrm>
+          <a:prstGeom prst="straightConnector1">
+            <a:avLst/>
+          </a:prstGeom>
+          <a:ln>
+            <a:tailEnd type="triangle"/>
+          </a:ln>
+        </p:spPr>
+        <p:style>
+          <a:lnRef idx="1">
+            <a:schemeClr val="accent1"/>
+          </a:lnRef>
+          <a:fillRef idx="0">
+            <a:schemeClr val="accent1"/>
+          </a:fillRef>
+          <a:effectRef idx="0">
+            <a:schemeClr val="accent1"/>
+          </a:effectRef>
+          <a:fontRef idx="minor">
+            <a:schemeClr val="tx1"/>
+          </a:fontRef>
+        </p:style>
+      </p:cxnSp>
+      <p:sp>
+        <p:nvSpPr>
+          <p:cNvPr id="135" name="TextBox 134"/>
+          <p:cNvSpPr txBox="1"/>
+          <p:nvPr/>
+        </p:nvSpPr>
+        <p:spPr>
+          <a:xfrm>
+            <a:off x="2826220" y="704560"/>
+            <a:ext cx="3773796" cy="169277"/>
+          </a:xfrm>
+          <a:prstGeom prst="rect">
+            <a:avLst/>
+          </a:prstGeom>
+          <a:noFill/>
+        </p:spPr>
+        <p:txBody>
+          <a:bodyPr wrap="square" rtlCol="0">
+            <a:spAutoFit/>
+          </a:bodyPr>
+          <a:lstStyle/>
+          <a:p>
+            <a:r>
+              <a:rPr lang="en-US" sz="500" dirty="0" smtClean="0"/>
+              <a:t>Enter into the next room		Head up stairway				go back</a:t>
+            </a:r>
+            <a:endParaRPr lang="en-US" sz="500" dirty="0"/>
+          </a:p>
+        </p:txBody>
+      </p:sp>
+      <p:sp>
+        <p:nvSpPr>
+          <p:cNvPr id="137" name="TextBox 136"/>
+          <p:cNvSpPr txBox="1"/>
+          <p:nvPr/>
+        </p:nvSpPr>
+        <p:spPr>
+          <a:xfrm>
+            <a:off x="1509494" y="1660448"/>
+            <a:ext cx="4870929" cy="169277"/>
+          </a:xfrm>
+          <a:prstGeom prst="rect">
+            <a:avLst/>
+          </a:prstGeom>
+          <a:noFill/>
+        </p:spPr>
+        <p:txBody>
+          <a:bodyPr wrap="square" rtlCol="0">
+            <a:spAutoFit/>
+          </a:bodyPr>
+          <a:lstStyle/>
+          <a:p>
+            <a:r>
+              <a:rPr lang="en-US" sz="500" dirty="0" err="1" smtClean="0"/>
+              <a:t>Adsf</a:t>
+            </a:r>
+            <a:r>
+              <a:rPr lang="en-US" sz="500" dirty="0" smtClean="0"/>
+              <a:t>						peer out the window        interact with controls </a:t>
+            </a:r>
+            <a:endParaRPr lang="en-US" sz="500" dirty="0"/>
+          </a:p>
+        </p:txBody>
+      </p:sp>
+      <p:cxnSp>
+        <p:nvCxnSpPr>
+          <p:cNvPr id="145" name="Elbow Connector 144"/>
+          <p:cNvCxnSpPr>
+            <a:stCxn id="7" idx="6"/>
+            <a:endCxn id="5" idx="6"/>
+          </p:cNvCxnSpPr>
+          <p:nvPr/>
+        </p:nvCxnSpPr>
+        <p:spPr>
+          <a:xfrm flipH="1" flipV="1">
+            <a:off x="4305783" y="526648"/>
+            <a:ext cx="974564" cy="617791"/>
+          </a:xfrm>
+          <a:prstGeom prst="bentConnector3">
+            <a:avLst>
+              <a:gd name="adj1" fmla="val -104252"/>
+            </a:avLst>
+          </a:prstGeom>
+          <a:ln>
+            <a:tailEnd type="triangle"/>
+          </a:ln>
+        </p:spPr>
+        <p:style>
+          <a:lnRef idx="1">
+            <a:schemeClr val="accent1"/>
+          </a:lnRef>
+          <a:fillRef idx="0">
+            <a:schemeClr val="accent1"/>
+          </a:fillRef>
+          <a:effectRef idx="0">
+            <a:schemeClr val="accent1"/>
+          </a:effectRef>
+          <a:fontRef idx="minor">
+            <a:schemeClr val="tx1"/>
+          </a:fontRef>
+        </p:style>
+      </p:cxnSp>
+      <p:cxnSp>
+        <p:nvCxnSpPr>
+          <p:cNvPr id="149" name="Elbow Connector 148"/>
+          <p:cNvCxnSpPr>
+            <a:stCxn id="8" idx="2"/>
+            <a:endCxn id="7" idx="2"/>
+          </p:cNvCxnSpPr>
+          <p:nvPr/>
+        </p:nvCxnSpPr>
+        <p:spPr>
+          <a:xfrm rot="10800000" flipH="1">
+            <a:off x="3955354" y="1144439"/>
+            <a:ext cx="665236" cy="1493626"/>
+          </a:xfrm>
+          <a:prstGeom prst="bentConnector3">
+            <a:avLst>
+              <a:gd name="adj1" fmla="val -20364"/>
+            </a:avLst>
+          </a:prstGeom>
+          <a:ln>
+            <a:tailEnd type="triangle"/>
+          </a:ln>
+        </p:spPr>
+        <p:style>
+          <a:lnRef idx="1">
+            <a:schemeClr val="accent1"/>
+          </a:lnRef>
+          <a:fillRef idx="0">
+            <a:schemeClr val="accent1"/>
+          </a:fillRef>
+          <a:effectRef idx="0">
+            <a:schemeClr val="accent1"/>
+          </a:effectRef>
+          <a:fontRef idx="minor">
+            <a:schemeClr val="tx1"/>
+          </a:fontRef>
+        </p:style>
+      </p:cxnSp>
+      <p:sp>
+        <p:nvSpPr>
+          <p:cNvPr id="151" name="TextBox 150"/>
+          <p:cNvSpPr txBox="1"/>
+          <p:nvPr/>
+        </p:nvSpPr>
+        <p:spPr>
+          <a:xfrm>
+            <a:off x="2310129" y="2973723"/>
+            <a:ext cx="3773796" cy="169277"/>
+          </a:xfrm>
+          <a:prstGeom prst="rect">
+            <a:avLst/>
+          </a:prstGeom>
+          <a:noFill/>
+        </p:spPr>
+        <p:txBody>
+          <a:bodyPr wrap="square" rtlCol="0">
+            <a:spAutoFit/>
+          </a:bodyPr>
+          <a:lstStyle/>
+          <a:p>
+            <a:pPr lvl="3"/>
+            <a:r>
+              <a:rPr lang="en-US" sz="500" dirty="0" smtClean="0"/>
+              <a:t>		</a:t>
+            </a:r>
+            <a:r>
+              <a:rPr lang="en-US" sz="500" smtClean="0"/>
+              <a:t>turn key	                    </a:t>
+            </a:r>
+            <a:endParaRPr lang="en-US" sz="500" dirty="0"/>
+          </a:p>
+        </p:txBody>
+      </p:sp>
     </p:spTree>
     <p:extLst>
       <p:ext uri="{BB962C8B-B14F-4D97-AF65-F5344CB8AC3E}">

</xml_diff>